<commit_message>
zmiany w prezentacji; nowe analizy z tableau
</commit_message>
<xml_diff>
--- a/robocza_prezentacja/Project.1.Happiness.by.Tylda_ROBOCZA_ver1.pptx
+++ b/robocza_prezentacja/Project.1.Happiness.by.Tylda_ROBOCZA_ver1.pptx
@@ -5,7 +5,7 @@
     <p:sldMasterId id="2147483666" r:id="rId1"/>
   </p:sldMasterIdLst>
   <p:notesMasterIdLst>
-    <p:notesMasterId r:id="rId19"/>
+    <p:notesMasterId r:id="rId29"/>
   </p:notesMasterIdLst>
   <p:sldIdLst>
     <p:sldId id="295" r:id="rId2"/>
@@ -24,7 +24,17 @@
     <p:sldId id="301" r:id="rId15"/>
     <p:sldId id="299" r:id="rId16"/>
     <p:sldId id="297" r:id="rId17"/>
-    <p:sldId id="294" r:id="rId18"/>
+    <p:sldId id="312" r:id="rId18"/>
+    <p:sldId id="313" r:id="rId19"/>
+    <p:sldId id="315" r:id="rId20"/>
+    <p:sldId id="316" r:id="rId21"/>
+    <p:sldId id="314" r:id="rId22"/>
+    <p:sldId id="319" r:id="rId23"/>
+    <p:sldId id="320" r:id="rId24"/>
+    <p:sldId id="321" r:id="rId25"/>
+    <p:sldId id="317" r:id="rId26"/>
+    <p:sldId id="318" r:id="rId27"/>
+    <p:sldId id="294" r:id="rId28"/>
   </p:sldIdLst>
   <p:sldSz cx="12192000" cy="6858000"/>
   <p:notesSz cx="6858000" cy="9144000"/>
@@ -10371,7 +10381,9 @@
         </p:nvSpPr>
         <p:spPr/>
         <p:txBody>
-          <a:bodyPr/>
+          <a:bodyPr>
+            <a:normAutofit fontScale="92500"/>
+          </a:bodyPr>
           <a:lstStyle/>
           <a:p>
             <a:pPr marL="101600" indent="0">
@@ -10408,7 +10420,387 @@
             </a:pPr>
             <a:r>
               <a:rPr lang="en-GB" dirty="0"/>
-              <a:t>…</a:t>
+              <a:t>Jaki jest </a:t>
+            </a:r>
+            <a:r>
+              <a:rPr lang="en-GB" dirty="0" err="1"/>
+              <a:t>średni</a:t>
+            </a:r>
+            <a:r>
+              <a:rPr lang="en-GB" dirty="0"/>
+              <a:t> score </a:t>
+            </a:r>
+            <a:r>
+              <a:rPr lang="en-GB" dirty="0" err="1"/>
+              <a:t>dla</a:t>
+            </a:r>
+            <a:r>
+              <a:rPr lang="en-GB" dirty="0"/>
+              <a:t> </a:t>
+            </a:r>
+            <a:r>
+              <a:rPr lang="en-GB" dirty="0" err="1"/>
+              <a:t>regionów</a:t>
+            </a:r>
+            <a:r>
+              <a:rPr lang="en-GB" dirty="0"/>
+              <a:t> </a:t>
+            </a:r>
+            <a:r>
+              <a:rPr lang="en-GB" dirty="0" err="1"/>
+              <a:t>oraz</a:t>
+            </a:r>
+            <a:r>
+              <a:rPr lang="en-GB" dirty="0"/>
+              <a:t> </a:t>
+            </a:r>
+            <a:r>
+              <a:rPr lang="en-GB" dirty="0" err="1"/>
+              <a:t>dla</a:t>
+            </a:r>
+            <a:r>
+              <a:rPr lang="en-GB" dirty="0"/>
+              <a:t> </a:t>
+            </a:r>
+            <a:r>
+              <a:rPr lang="en-GB" dirty="0" err="1"/>
+              <a:t>krajów</a:t>
+            </a:r>
+            <a:r>
+              <a:rPr lang="en-GB" dirty="0"/>
+              <a:t> </a:t>
+            </a:r>
+            <a:r>
+              <a:rPr lang="en-GB" dirty="0" err="1"/>
+              <a:t>na</a:t>
+            </a:r>
+            <a:r>
+              <a:rPr lang="en-GB" dirty="0"/>
+              <a:t> </a:t>
+            </a:r>
+            <a:r>
+              <a:rPr lang="en-GB" dirty="0" err="1"/>
+              <a:t>przestrzeni</a:t>
+            </a:r>
+            <a:r>
+              <a:rPr lang="en-GB" dirty="0"/>
+              <a:t> </a:t>
+            </a:r>
+            <a:r>
+              <a:rPr lang="en-GB" dirty="0" err="1"/>
+              <a:t>badanych</a:t>
+            </a:r>
+            <a:r>
+              <a:rPr lang="en-GB" dirty="0"/>
+              <a:t> </a:t>
+            </a:r>
+            <a:r>
+              <a:rPr lang="en-GB" dirty="0" err="1"/>
+              <a:t>lat</a:t>
+            </a:r>
+            <a:r>
+              <a:rPr lang="en-GB" dirty="0"/>
+              <a:t>?</a:t>
+            </a:r>
+          </a:p>
+          <a:p>
+            <a:pPr marL="558800" indent="-457200">
+              <a:buAutoNum type="arabicPeriod"/>
+            </a:pPr>
+            <a:r>
+              <a:rPr lang="en-GB" dirty="0"/>
+              <a:t>Jak </a:t>
+            </a:r>
+            <a:r>
+              <a:rPr lang="en-GB" dirty="0" err="1"/>
+              <a:t>zmieniały</a:t>
+            </a:r>
+            <a:r>
+              <a:rPr lang="en-GB" dirty="0"/>
+              <a:t> </a:t>
+            </a:r>
+            <a:r>
+              <a:rPr lang="en-GB" dirty="0" err="1"/>
+              <a:t>się</a:t>
+            </a:r>
+            <a:r>
+              <a:rPr lang="en-GB" dirty="0"/>
+              <a:t> </a:t>
+            </a:r>
+            <a:r>
+              <a:rPr lang="en-GB" dirty="0" err="1"/>
+              <a:t>powyższe</a:t>
+            </a:r>
+            <a:r>
+              <a:rPr lang="en-GB" dirty="0"/>
+              <a:t> </a:t>
+            </a:r>
+            <a:r>
+              <a:rPr lang="en-GB" dirty="0" err="1"/>
+              <a:t>wyniki</a:t>
+            </a:r>
+            <a:r>
+              <a:rPr lang="en-GB" dirty="0"/>
+              <a:t> </a:t>
+            </a:r>
+            <a:r>
+              <a:rPr lang="en-GB" dirty="0" err="1"/>
+              <a:t>na</a:t>
+            </a:r>
+            <a:r>
+              <a:rPr lang="en-GB" dirty="0"/>
+              <a:t> </a:t>
+            </a:r>
+            <a:r>
+              <a:rPr lang="en-GB" dirty="0" err="1"/>
+              <a:t>przestrzeni</a:t>
+            </a:r>
+            <a:r>
+              <a:rPr lang="en-GB" dirty="0"/>
+              <a:t> </a:t>
+            </a:r>
+            <a:r>
+              <a:rPr lang="en-GB" dirty="0" err="1"/>
+              <a:t>lat</a:t>
+            </a:r>
+            <a:r>
+              <a:rPr lang="en-GB" dirty="0"/>
+              <a:t>?</a:t>
+            </a:r>
+          </a:p>
+          <a:p>
+            <a:pPr marL="558800" indent="-457200">
+              <a:buAutoNum type="arabicPeriod"/>
+            </a:pPr>
+            <a:r>
+              <a:rPr lang="en-GB" dirty="0" err="1"/>
+              <a:t>Który</a:t>
+            </a:r>
+            <a:r>
+              <a:rPr lang="en-GB" dirty="0"/>
+              <a:t> region </a:t>
+            </a:r>
+            <a:r>
+              <a:rPr lang="en-GB" dirty="0" err="1"/>
+              <a:t>i</a:t>
+            </a:r>
+            <a:r>
+              <a:rPr lang="en-GB" dirty="0"/>
+              <a:t> </a:t>
+            </a:r>
+            <a:r>
+              <a:rPr lang="en-GB" dirty="0" err="1"/>
+              <a:t>kraj</a:t>
+            </a:r>
+            <a:r>
+              <a:rPr lang="en-GB" dirty="0"/>
+              <a:t> jest “</a:t>
+            </a:r>
+            <a:r>
+              <a:rPr lang="en-GB" dirty="0" err="1"/>
+              <a:t>najszczęśliwszy</a:t>
+            </a:r>
+            <a:r>
+              <a:rPr lang="en-GB" dirty="0"/>
+              <a:t>”, a </a:t>
+            </a:r>
+            <a:r>
+              <a:rPr lang="en-GB" dirty="0" err="1"/>
+              <a:t>który</a:t>
+            </a:r>
+            <a:r>
+              <a:rPr lang="en-GB" dirty="0"/>
+              <a:t> </a:t>
+            </a:r>
+            <a:r>
+              <a:rPr lang="en-GB" dirty="0" err="1"/>
+              <a:t>najmniej</a:t>
+            </a:r>
+            <a:r>
+              <a:rPr lang="en-GB" dirty="0"/>
+              <a:t>? Na </a:t>
+            </a:r>
+            <a:r>
+              <a:rPr lang="en-GB" dirty="0" err="1"/>
+              <a:t>którym</a:t>
+            </a:r>
+            <a:r>
+              <a:rPr lang="en-GB" dirty="0"/>
+              <a:t> </a:t>
+            </a:r>
+            <a:r>
+              <a:rPr lang="en-GB" dirty="0" err="1"/>
+              <a:t>miejscu</a:t>
+            </a:r>
+            <a:r>
+              <a:rPr lang="en-GB" dirty="0"/>
+              <a:t> </a:t>
+            </a:r>
+            <a:r>
+              <a:rPr lang="en-GB" dirty="0" err="1"/>
+              <a:t>plasuje</a:t>
+            </a:r>
+            <a:r>
+              <a:rPr lang="en-GB" dirty="0"/>
+              <a:t> </a:t>
+            </a:r>
+            <a:r>
+              <a:rPr lang="en-GB" dirty="0" err="1"/>
+              <a:t>się</a:t>
+            </a:r>
+            <a:r>
+              <a:rPr lang="en-GB" dirty="0"/>
+              <a:t> Polska?</a:t>
+            </a:r>
+          </a:p>
+          <a:p>
+            <a:pPr marL="558800" indent="-457200">
+              <a:buAutoNum type="arabicPeriod"/>
+            </a:pPr>
+            <a:r>
+              <a:rPr lang="en-GB" dirty="0" err="1"/>
+              <a:t>Badając</a:t>
+            </a:r>
+            <a:r>
+              <a:rPr lang="en-GB" dirty="0"/>
+              <a:t> </a:t>
+            </a:r>
+            <a:r>
+              <a:rPr lang="en-GB" dirty="0" err="1"/>
+              <a:t>najszczęśliwszy</a:t>
+            </a:r>
+            <a:r>
+              <a:rPr lang="en-GB" dirty="0"/>
+              <a:t> </a:t>
+            </a:r>
+            <a:r>
+              <a:rPr lang="en-GB" dirty="0" err="1"/>
+              <a:t>kraj</a:t>
+            </a:r>
+            <a:r>
+              <a:rPr lang="en-GB" dirty="0"/>
+              <a:t> – </a:t>
+            </a:r>
+            <a:r>
+              <a:rPr lang="en-GB" dirty="0" err="1"/>
+              <a:t>jaki</a:t>
+            </a:r>
+            <a:r>
+              <a:rPr lang="en-GB" dirty="0"/>
+              <a:t> </a:t>
+            </a:r>
+            <a:r>
+              <a:rPr lang="en-GB" dirty="0" err="1"/>
+              <a:t>czynnik</a:t>
+            </a:r>
+            <a:r>
+              <a:rPr lang="en-GB" dirty="0"/>
+              <a:t> </a:t>
+            </a:r>
+            <a:r>
+              <a:rPr lang="en-GB" dirty="0" err="1"/>
+              <a:t>miał</a:t>
+            </a:r>
+            <a:r>
+              <a:rPr lang="en-GB" dirty="0"/>
+              <a:t> </a:t>
+            </a:r>
+            <a:r>
+              <a:rPr lang="en-GB" dirty="0" err="1"/>
+              <a:t>największy</a:t>
+            </a:r>
+            <a:r>
+              <a:rPr lang="en-GB" dirty="0"/>
+              <a:t> </a:t>
+            </a:r>
+            <a:r>
+              <a:rPr lang="en-GB" dirty="0" err="1"/>
+              <a:t>wpływ</a:t>
+            </a:r>
+            <a:r>
+              <a:rPr lang="en-GB" dirty="0"/>
+              <a:t>? A </a:t>
+            </a:r>
+            <a:r>
+              <a:rPr lang="en-GB" dirty="0" err="1"/>
+              <a:t>jaki</a:t>
+            </a:r>
+            <a:r>
+              <a:rPr lang="en-GB" dirty="0"/>
+              <a:t> </a:t>
+            </a:r>
+            <a:r>
+              <a:rPr lang="en-GB" dirty="0" err="1"/>
+              <a:t>czynnik</a:t>
+            </a:r>
+            <a:r>
+              <a:rPr lang="en-GB" dirty="0"/>
+              <a:t> </a:t>
+            </a:r>
+            <a:r>
+              <a:rPr lang="en-GB" dirty="0" err="1"/>
+              <a:t>dla</a:t>
+            </a:r>
+            <a:r>
+              <a:rPr lang="en-GB" dirty="0"/>
+              <a:t> </a:t>
+            </a:r>
+            <a:r>
+              <a:rPr lang="en-GB" dirty="0" err="1"/>
+              <a:t>kraju</a:t>
+            </a:r>
+            <a:r>
+              <a:rPr lang="en-GB" dirty="0"/>
+              <a:t> </a:t>
+            </a:r>
+            <a:r>
+              <a:rPr lang="en-GB" dirty="0" err="1"/>
+              <a:t>najmniej</a:t>
+            </a:r>
+            <a:r>
+              <a:rPr lang="en-GB" dirty="0"/>
+              <a:t> </a:t>
+            </a:r>
+            <a:r>
+              <a:rPr lang="en-GB" dirty="0" err="1"/>
+              <a:t>szczęśliwego</a:t>
+            </a:r>
+            <a:r>
+              <a:rPr lang="en-GB" dirty="0"/>
+              <a:t>?</a:t>
+            </a:r>
+          </a:p>
+          <a:p>
+            <a:pPr marL="558800" indent="-457200">
+              <a:buAutoNum type="arabicPeriod"/>
+            </a:pPr>
+            <a:endParaRPr lang="en-GB" dirty="0"/>
+          </a:p>
+          <a:p>
+            <a:pPr marL="558800" indent="-457200">
+              <a:buAutoNum type="arabicPeriod"/>
+            </a:pPr>
+            <a:r>
+              <a:rPr lang="en-GB" dirty="0"/>
+              <a:t>How did countries score changes between the 2015 and 2019 reports? – quick summary of facts</a:t>
+            </a:r>
+          </a:p>
+          <a:p>
+            <a:pPr marL="558800" indent="-457200">
+              <a:buAutoNum type="arabicPeriod"/>
+            </a:pPr>
+            <a:r>
+              <a:rPr lang="en-GB" dirty="0"/>
+              <a:t>What countries or regions rank the highest &amp; the lowest in overall happiness and each of the six factors contributing to happiness &amp; WHY? - analysis</a:t>
+            </a:r>
+          </a:p>
+          <a:p>
+            <a:pPr marL="558800" indent="-457200">
+              <a:buAutoNum type="arabicPeriod"/>
+            </a:pPr>
+            <a:r>
+              <a:rPr lang="en-GB" dirty="0"/>
+              <a:t>Did any country experience a significant increase or decrease in happiness &amp; WHY? - analysis</a:t>
             </a:r>
           </a:p>
           <a:p>
@@ -14206,7 +14598,7 @@
           <p:cNvPr id="2" name="Title 1">
             <a:extLst>
               <a:ext uri="{FF2B5EF4-FFF2-40B4-BE49-F238E27FC236}">
-                <a16:creationId xmlns:a16="http://schemas.microsoft.com/office/drawing/2014/main" id="{A4E131D9-2A3D-872C-C30C-2482491AD2E1}"/>
+                <a16:creationId xmlns:a16="http://schemas.microsoft.com/office/drawing/2014/main" id="{2B3D1658-8B98-8385-30F6-E442C1EA63FA}"/>
               </a:ext>
             </a:extLst>
           </p:cNvPr>
@@ -14217,38 +14609,674 @@
             <p:ph type="title"/>
           </p:nvPr>
         </p:nvSpPr>
+        <p:spPr>
+          <a:xfrm>
+            <a:off x="1110174" y="466650"/>
+            <a:ext cx="10769075" cy="509700"/>
+          </a:xfrm>
+        </p:spPr>
+        <p:txBody>
+          <a:bodyPr>
+            <a:normAutofit fontScale="90000"/>
+          </a:bodyPr>
+          <a:lstStyle/>
+          <a:p>
+            <a:r>
+              <a:rPr lang="en-GB" dirty="0" err="1"/>
+              <a:t>Średnia</a:t>
+            </a:r>
+            <a:r>
+              <a:rPr lang="en-GB" dirty="0"/>
+              <a:t> </a:t>
+            </a:r>
+            <a:r>
+              <a:rPr lang="en-GB" dirty="0" err="1"/>
+              <a:t>wyniku</a:t>
+            </a:r>
+            <a:r>
+              <a:rPr lang="en-GB" dirty="0"/>
+              <a:t> </a:t>
+            </a:r>
+            <a:r>
+              <a:rPr lang="en-GB" dirty="0" err="1"/>
+              <a:t>dla</a:t>
+            </a:r>
+            <a:r>
+              <a:rPr lang="en-GB" dirty="0"/>
+              <a:t> </a:t>
+            </a:r>
+            <a:r>
+              <a:rPr lang="en-GB" dirty="0" err="1"/>
+              <a:t>regionów</a:t>
+            </a:r>
+            <a:r>
+              <a:rPr lang="en-GB" dirty="0"/>
+              <a:t> </a:t>
+            </a:r>
+            <a:r>
+              <a:rPr lang="en-GB" dirty="0" err="1"/>
+              <a:t>na</a:t>
+            </a:r>
+            <a:r>
+              <a:rPr lang="en-GB" dirty="0"/>
+              <a:t> </a:t>
+            </a:r>
+            <a:r>
+              <a:rPr lang="en-GB" dirty="0" err="1"/>
+              <a:t>przestrzeni</a:t>
+            </a:r>
+            <a:r>
+              <a:rPr lang="en-GB" dirty="0"/>
+              <a:t> </a:t>
+            </a:r>
+            <a:r>
+              <a:rPr lang="en-GB" dirty="0" err="1"/>
+              <a:t>badanych</a:t>
+            </a:r>
+            <a:r>
+              <a:rPr lang="en-GB" dirty="0"/>
+              <a:t> </a:t>
+            </a:r>
+            <a:r>
+              <a:rPr lang="en-GB" dirty="0" err="1"/>
+              <a:t>lat</a:t>
+            </a:r>
+            <a:br>
+              <a:rPr lang="en-GB" dirty="0"/>
+            </a:br>
+            <a:endParaRPr lang="en-GB" dirty="0"/>
+          </a:p>
+        </p:txBody>
+      </p:sp>
+      <p:sp>
+        <p:nvSpPr>
+          <p:cNvPr id="3" name="Text Placeholder 2">
+            <a:extLst>
+              <a:ext uri="{FF2B5EF4-FFF2-40B4-BE49-F238E27FC236}">
+                <a16:creationId xmlns:a16="http://schemas.microsoft.com/office/drawing/2014/main" id="{BE531AF0-8DB5-A612-331A-2B7E2F00BF3B}"/>
+              </a:ext>
+            </a:extLst>
+          </p:cNvPr>
+          <p:cNvSpPr>
+            <a:spLocks noGrp="1"/>
+          </p:cNvSpPr>
+          <p:nvPr>
+            <p:ph type="body" idx="1"/>
+          </p:nvPr>
+        </p:nvSpPr>
         <p:spPr/>
         <p:txBody>
           <a:bodyPr/>
           <a:lstStyle/>
           <a:p>
-            <a:r>
-              <a:rPr lang="en-GB" sz="1800" dirty="0">
-                <a:solidFill>
-                  <a:srgbClr val="669768"/>
-                </a:solidFill>
-                <a:effectLst/>
-                <a:latin typeface="Consolas" panose="020B0609020204030204" pitchFamily="49" charset="0"/>
-              </a:rPr>
-              <a:t>--the end--</a:t>
+            <a:endParaRPr lang="en-GB" dirty="0"/>
+          </a:p>
+        </p:txBody>
+      </p:sp>
+      <p:pic>
+        <p:nvPicPr>
+          <p:cNvPr id="5" name="Picture 4">
+            <a:extLst>
+              <a:ext uri="{FF2B5EF4-FFF2-40B4-BE49-F238E27FC236}">
+                <a16:creationId xmlns:a16="http://schemas.microsoft.com/office/drawing/2014/main" id="{943A6DE0-DE85-A2AE-A2A4-A45F4F97370E}"/>
+              </a:ext>
+            </a:extLst>
+          </p:cNvPr>
+          <p:cNvPicPr>
+            <a:picLocks noChangeAspect="1"/>
+          </p:cNvPicPr>
+          <p:nvPr/>
+        </p:nvPicPr>
+        <p:blipFill>
+          <a:blip r:embed="rId2"/>
+          <a:stretch>
+            <a:fillRect/>
+          </a:stretch>
+        </p:blipFill>
+        <p:spPr>
+          <a:xfrm>
+            <a:off x="5109209" y="1247775"/>
+            <a:ext cx="6787515" cy="4800600"/>
+          </a:xfrm>
+          <a:prstGeom prst="rect">
+            <a:avLst/>
+          </a:prstGeom>
+        </p:spPr>
+      </p:pic>
+    </p:spTree>
+    <p:extLst>
+      <p:ext uri="{BB962C8B-B14F-4D97-AF65-F5344CB8AC3E}">
+        <p14:creationId xmlns:p14="http://schemas.microsoft.com/office/powerpoint/2010/main" val="3941702345"/>
+      </p:ext>
+    </p:extLst>
+  </p:cSld>
+  <p:clrMapOvr>
+    <a:masterClrMapping/>
+  </p:clrMapOvr>
+</p:sld>
+</file>
+
+<file path=ppt/slides/slide18.xml><?xml version="1.0" encoding="utf-8"?>
+<p:sld xmlns:a="http://schemas.openxmlformats.org/drawingml/2006/main" xmlns:r="http://schemas.openxmlformats.org/officeDocument/2006/relationships" xmlns:p="http://schemas.openxmlformats.org/presentationml/2006/main">
+  <p:cSld>
+    <p:spTree>
+      <p:nvGrpSpPr>
+        <p:cNvPr id="1" name=""/>
+        <p:cNvGrpSpPr/>
+        <p:nvPr/>
+      </p:nvGrpSpPr>
+      <p:grpSpPr>
+        <a:xfrm>
+          <a:off x="0" y="0"/>
+          <a:ext cx="0" cy="0"/>
+          <a:chOff x="0" y="0"/>
+          <a:chExt cx="0" cy="0"/>
+        </a:xfrm>
+      </p:grpSpPr>
+      <p:sp>
+        <p:nvSpPr>
+          <p:cNvPr id="2" name="Title 1">
+            <a:extLst>
+              <a:ext uri="{FF2B5EF4-FFF2-40B4-BE49-F238E27FC236}">
+                <a16:creationId xmlns:a16="http://schemas.microsoft.com/office/drawing/2014/main" id="{2B3D1658-8B98-8385-30F6-E442C1EA63FA}"/>
+              </a:ext>
+            </a:extLst>
+          </p:cNvPr>
+          <p:cNvSpPr>
+            <a:spLocks noGrp="1"/>
+          </p:cNvSpPr>
+          <p:nvPr>
+            <p:ph type="title"/>
+          </p:nvPr>
+        </p:nvSpPr>
+        <p:spPr>
+          <a:xfrm>
+            <a:off x="1110174" y="466650"/>
+            <a:ext cx="10769075" cy="509700"/>
+          </a:xfrm>
+        </p:spPr>
+        <p:txBody>
+          <a:bodyPr>
+            <a:normAutofit fontScale="90000"/>
+          </a:bodyPr>
+          <a:lstStyle/>
+          <a:p>
+            <a:r>
+              <a:rPr lang="en-GB" dirty="0" err="1"/>
+              <a:t>Średnia</a:t>
+            </a:r>
+            <a:r>
+              <a:rPr lang="en-GB" dirty="0"/>
+              <a:t> </a:t>
+            </a:r>
+            <a:r>
+              <a:rPr lang="en-GB" dirty="0" err="1"/>
+              <a:t>wyniku</a:t>
+            </a:r>
+            <a:r>
+              <a:rPr lang="en-GB" dirty="0"/>
+              <a:t> </a:t>
+            </a:r>
+            <a:r>
+              <a:rPr lang="en-GB" dirty="0" err="1"/>
+              <a:t>dla</a:t>
+            </a:r>
+            <a:r>
+              <a:rPr lang="en-GB" dirty="0"/>
+              <a:t> </a:t>
+            </a:r>
+            <a:r>
+              <a:rPr lang="en-GB" dirty="0" err="1"/>
+              <a:t>krajów</a:t>
+            </a:r>
+            <a:r>
+              <a:rPr lang="en-GB" dirty="0"/>
+              <a:t> </a:t>
+            </a:r>
+            <a:r>
+              <a:rPr lang="en-GB" dirty="0" err="1"/>
+              <a:t>na</a:t>
+            </a:r>
+            <a:r>
+              <a:rPr lang="en-GB" dirty="0"/>
+              <a:t> </a:t>
+            </a:r>
+            <a:r>
+              <a:rPr lang="en-GB" dirty="0" err="1"/>
+              <a:t>przestrzeni</a:t>
+            </a:r>
+            <a:r>
+              <a:rPr lang="en-GB" dirty="0"/>
+              <a:t> </a:t>
+            </a:r>
+            <a:r>
+              <a:rPr lang="en-GB" dirty="0" err="1"/>
+              <a:t>badanych</a:t>
+            </a:r>
+            <a:r>
+              <a:rPr lang="en-GB" dirty="0"/>
+              <a:t> </a:t>
+            </a:r>
+            <a:r>
+              <a:rPr lang="en-GB" dirty="0" err="1"/>
+              <a:t>lat</a:t>
             </a:r>
             <a:br>
-              <a:rPr lang="en-GB" sz="1800" dirty="0">
-                <a:solidFill>
-                  <a:srgbClr val="AAAAAA"/>
-                </a:solidFill>
-                <a:effectLst/>
-                <a:latin typeface="Consolas" panose="020B0609020204030204" pitchFamily="49" charset="0"/>
-              </a:rPr>
+              <a:rPr lang="en-GB" dirty="0"/>
             </a:br>
             <a:endParaRPr lang="en-GB" dirty="0"/>
+          </a:p>
+        </p:txBody>
+      </p:sp>
+      <p:sp>
+        <p:nvSpPr>
+          <p:cNvPr id="3" name="Text Placeholder 2">
+            <a:extLst>
+              <a:ext uri="{FF2B5EF4-FFF2-40B4-BE49-F238E27FC236}">
+                <a16:creationId xmlns:a16="http://schemas.microsoft.com/office/drawing/2014/main" id="{BE531AF0-8DB5-A612-331A-2B7E2F00BF3B}"/>
+              </a:ext>
+            </a:extLst>
+          </p:cNvPr>
+          <p:cNvSpPr>
+            <a:spLocks noGrp="1"/>
+          </p:cNvSpPr>
+          <p:nvPr>
+            <p:ph type="body" idx="1"/>
+          </p:nvPr>
+        </p:nvSpPr>
+        <p:spPr/>
+        <p:txBody>
+          <a:bodyPr/>
+          <a:lstStyle/>
+          <a:p>
+            <a:r>
+              <a:rPr lang="en-GB" dirty="0" err="1"/>
+              <a:t>Najszczęśliwsi</a:t>
+            </a:r>
+            <a:r>
+              <a:rPr lang="en-GB" dirty="0"/>
+              <a:t> …</a:t>
+            </a:r>
+          </a:p>
+          <a:p>
+            <a:r>
+              <a:rPr lang="en-GB" dirty="0"/>
+              <a:t>Max </a:t>
+            </a:r>
+            <a:r>
+              <a:rPr lang="en-GB" dirty="0" err="1"/>
+              <a:t>wynik</a:t>
+            </a:r>
+            <a:r>
+              <a:rPr lang="en-GB" dirty="0"/>
+              <a:t> to 7.55</a:t>
+            </a:r>
+          </a:p>
+        </p:txBody>
+      </p:sp>
+      <p:pic>
+        <p:nvPicPr>
+          <p:cNvPr id="5" name="Picture 4">
+            <a:extLst>
+              <a:ext uri="{FF2B5EF4-FFF2-40B4-BE49-F238E27FC236}">
+                <a16:creationId xmlns:a16="http://schemas.microsoft.com/office/drawing/2014/main" id="{EDA48D87-7E0D-D6A6-BB26-77062302D1F4}"/>
+              </a:ext>
+            </a:extLst>
+          </p:cNvPr>
+          <p:cNvPicPr>
+            <a:picLocks noChangeAspect="1"/>
+          </p:cNvPicPr>
+          <p:nvPr/>
+        </p:nvPicPr>
+        <p:blipFill>
+          <a:blip r:embed="rId2"/>
+          <a:stretch>
+            <a:fillRect/>
+          </a:stretch>
+        </p:blipFill>
+        <p:spPr>
+          <a:xfrm>
+            <a:off x="4461527" y="1239900"/>
+            <a:ext cx="7417722" cy="4329578"/>
+          </a:xfrm>
+          <a:prstGeom prst="rect">
+            <a:avLst/>
+          </a:prstGeom>
+        </p:spPr>
+      </p:pic>
+    </p:spTree>
+    <p:extLst>
+      <p:ext uri="{BB962C8B-B14F-4D97-AF65-F5344CB8AC3E}">
+        <p14:creationId xmlns:p14="http://schemas.microsoft.com/office/powerpoint/2010/main" val="2485596530"/>
+      </p:ext>
+    </p:extLst>
+  </p:cSld>
+  <p:clrMapOvr>
+    <a:masterClrMapping/>
+  </p:clrMapOvr>
+</p:sld>
+</file>
+
+<file path=ppt/slides/slide19.xml><?xml version="1.0" encoding="utf-8"?>
+<p:sld xmlns:a="http://schemas.openxmlformats.org/drawingml/2006/main" xmlns:r="http://schemas.openxmlformats.org/officeDocument/2006/relationships" xmlns:p="http://schemas.openxmlformats.org/presentationml/2006/main">
+  <p:cSld>
+    <p:spTree>
+      <p:nvGrpSpPr>
+        <p:cNvPr id="1" name=""/>
+        <p:cNvGrpSpPr/>
+        <p:nvPr/>
+      </p:nvGrpSpPr>
+      <p:grpSpPr>
+        <a:xfrm>
+          <a:off x="0" y="0"/>
+          <a:ext cx="0" cy="0"/>
+          <a:chOff x="0" y="0"/>
+          <a:chExt cx="0" cy="0"/>
+        </a:xfrm>
+      </p:grpSpPr>
+      <p:sp>
+        <p:nvSpPr>
+          <p:cNvPr id="2" name="Title 1">
+            <a:extLst>
+              <a:ext uri="{FF2B5EF4-FFF2-40B4-BE49-F238E27FC236}">
+                <a16:creationId xmlns:a16="http://schemas.microsoft.com/office/drawing/2014/main" id="{2B3D1658-8B98-8385-30F6-E442C1EA63FA}"/>
+              </a:ext>
+            </a:extLst>
+          </p:cNvPr>
+          <p:cNvSpPr>
+            <a:spLocks noGrp="1"/>
+          </p:cNvSpPr>
+          <p:nvPr>
+            <p:ph type="title"/>
+          </p:nvPr>
+        </p:nvSpPr>
+        <p:spPr>
+          <a:xfrm>
+            <a:off x="1110174" y="466650"/>
+            <a:ext cx="10769075" cy="509700"/>
+          </a:xfrm>
+        </p:spPr>
+        <p:txBody>
+          <a:bodyPr>
+            <a:normAutofit fontScale="90000"/>
+          </a:bodyPr>
+          <a:lstStyle/>
+          <a:p>
+            <a:r>
+              <a:rPr lang="en-GB" dirty="0" err="1"/>
+              <a:t>Średnia</a:t>
+            </a:r>
+            <a:r>
+              <a:rPr lang="en-GB" dirty="0"/>
+              <a:t> </a:t>
+            </a:r>
+            <a:r>
+              <a:rPr lang="en-GB" dirty="0" err="1"/>
+              <a:t>wyniku</a:t>
+            </a:r>
+            <a:r>
+              <a:rPr lang="en-GB" dirty="0"/>
+              <a:t> </a:t>
+            </a:r>
+            <a:r>
+              <a:rPr lang="en-GB" dirty="0" err="1"/>
+              <a:t>dla</a:t>
+            </a:r>
+            <a:r>
+              <a:rPr lang="en-GB" dirty="0"/>
+              <a:t> </a:t>
+            </a:r>
+            <a:r>
+              <a:rPr lang="en-GB" dirty="0" err="1"/>
+              <a:t>krajów</a:t>
+            </a:r>
+            <a:r>
+              <a:rPr lang="en-GB" dirty="0"/>
+              <a:t> </a:t>
+            </a:r>
+            <a:r>
+              <a:rPr lang="en-GB" dirty="0" err="1"/>
+              <a:t>na</a:t>
+            </a:r>
+            <a:r>
+              <a:rPr lang="en-GB" dirty="0"/>
+              <a:t> </a:t>
+            </a:r>
+            <a:r>
+              <a:rPr lang="en-GB" dirty="0" err="1"/>
+              <a:t>przestrzeni</a:t>
+            </a:r>
+            <a:r>
+              <a:rPr lang="en-GB" dirty="0"/>
+              <a:t> </a:t>
+            </a:r>
+            <a:r>
+              <a:rPr lang="en-GB" dirty="0" err="1"/>
+              <a:t>badanych</a:t>
+            </a:r>
+            <a:r>
+              <a:rPr lang="en-GB" dirty="0"/>
+              <a:t> </a:t>
+            </a:r>
+            <a:r>
+              <a:rPr lang="en-GB" dirty="0" err="1"/>
+              <a:t>lat</a:t>
+            </a:r>
+            <a:br>
+              <a:rPr lang="en-GB" dirty="0"/>
+            </a:br>
+            <a:endParaRPr lang="en-GB" dirty="0"/>
+          </a:p>
+        </p:txBody>
+      </p:sp>
+      <p:sp>
+        <p:nvSpPr>
+          <p:cNvPr id="3" name="Text Placeholder 2">
+            <a:extLst>
+              <a:ext uri="{FF2B5EF4-FFF2-40B4-BE49-F238E27FC236}">
+                <a16:creationId xmlns:a16="http://schemas.microsoft.com/office/drawing/2014/main" id="{BE531AF0-8DB5-A612-331A-2B7E2F00BF3B}"/>
+              </a:ext>
+            </a:extLst>
+          </p:cNvPr>
+          <p:cNvSpPr>
+            <a:spLocks noGrp="1"/>
+          </p:cNvSpPr>
+          <p:nvPr>
+            <p:ph type="body" idx="1"/>
+          </p:nvPr>
+        </p:nvSpPr>
+        <p:spPr/>
+        <p:txBody>
+          <a:bodyPr/>
+          <a:lstStyle/>
+          <a:p>
+            <a:r>
+              <a:rPr lang="en-GB" dirty="0"/>
+              <a:t>Polska</a:t>
+            </a:r>
+          </a:p>
+        </p:txBody>
+      </p:sp>
+      <p:pic>
+        <p:nvPicPr>
+          <p:cNvPr id="6" name="Picture 5">
+            <a:extLst>
+              <a:ext uri="{FF2B5EF4-FFF2-40B4-BE49-F238E27FC236}">
+                <a16:creationId xmlns:a16="http://schemas.microsoft.com/office/drawing/2014/main" id="{1CE1ECE1-FAF0-A69F-3FEF-237FED706B3F}"/>
+              </a:ext>
+            </a:extLst>
+          </p:cNvPr>
+          <p:cNvPicPr>
+            <a:picLocks noChangeAspect="1"/>
+          </p:cNvPicPr>
+          <p:nvPr/>
+        </p:nvPicPr>
+        <p:blipFill>
+          <a:blip r:embed="rId2"/>
+          <a:stretch>
+            <a:fillRect/>
+          </a:stretch>
+        </p:blipFill>
+        <p:spPr>
+          <a:xfrm>
+            <a:off x="4461526" y="1239900"/>
+            <a:ext cx="7417723" cy="4346612"/>
+          </a:xfrm>
+          <a:prstGeom prst="rect">
+            <a:avLst/>
+          </a:prstGeom>
+        </p:spPr>
+      </p:pic>
+      <p:sp>
+        <p:nvSpPr>
+          <p:cNvPr id="7" name="Arrow: Right 6">
+            <a:extLst>
+              <a:ext uri="{FF2B5EF4-FFF2-40B4-BE49-F238E27FC236}">
+                <a16:creationId xmlns:a16="http://schemas.microsoft.com/office/drawing/2014/main" id="{699732A4-D73A-0203-67C5-A3D837B605A8}"/>
+              </a:ext>
+            </a:extLst>
+          </p:cNvPr>
+          <p:cNvSpPr/>
+          <p:nvPr/>
+        </p:nvSpPr>
+        <p:spPr>
+          <a:xfrm>
+            <a:off x="4381500" y="3308925"/>
+            <a:ext cx="695325" cy="400050"/>
+          </a:xfrm>
+          <a:prstGeom prst="rightArrow">
+            <a:avLst/>
+          </a:prstGeom>
+        </p:spPr>
+        <p:style>
+          <a:lnRef idx="2">
+            <a:schemeClr val="accent1">
+              <a:shade val="15000"/>
+            </a:schemeClr>
+          </a:lnRef>
+          <a:fillRef idx="1">
+            <a:schemeClr val="accent1"/>
+          </a:fillRef>
+          <a:effectRef idx="0">
+            <a:schemeClr val="accent1"/>
+          </a:effectRef>
+          <a:fontRef idx="minor">
+            <a:schemeClr val="lt1"/>
+          </a:fontRef>
+        </p:style>
+        <p:txBody>
+          <a:bodyPr rtlCol="0" anchor="ctr"/>
+          <a:lstStyle/>
+          <a:p>
+            <a:pPr algn="ctr"/>
+            <a:endParaRPr lang="en-GB"/>
+          </a:p>
+        </p:txBody>
+      </p:sp>
+      <p:sp>
+        <p:nvSpPr>
+          <p:cNvPr id="8" name="TextBox 7">
+            <a:extLst>
+              <a:ext uri="{FF2B5EF4-FFF2-40B4-BE49-F238E27FC236}">
+                <a16:creationId xmlns:a16="http://schemas.microsoft.com/office/drawing/2014/main" id="{9B3A23DB-2C6B-E6A9-B301-A84A8FB12690}"/>
+              </a:ext>
+            </a:extLst>
+          </p:cNvPr>
+          <p:cNvSpPr txBox="1"/>
+          <p:nvPr/>
+        </p:nvSpPr>
+        <p:spPr>
+          <a:xfrm>
+            <a:off x="3081337" y="5008809"/>
+            <a:ext cx="1647825" cy="1384995"/>
+          </a:xfrm>
+          <a:prstGeom prst="rect">
+            <a:avLst/>
+          </a:prstGeom>
+          <a:noFill/>
+          <a:ln>
+            <a:solidFill>
+              <a:schemeClr val="accent1"/>
+            </a:solidFill>
+          </a:ln>
+        </p:spPr>
+        <p:txBody>
+          <a:bodyPr wrap="square" rtlCol="0">
+            <a:spAutoFit/>
+          </a:bodyPr>
+          <a:lstStyle/>
+          <a:p>
+            <a:r>
+              <a:rPr lang="en-GB" dirty="0" err="1"/>
+              <a:t>Nie</a:t>
+            </a:r>
+            <a:r>
+              <a:rPr lang="en-GB" dirty="0"/>
+              <a:t> </a:t>
+            </a:r>
+            <a:r>
+              <a:rPr lang="en-GB" dirty="0" err="1"/>
+              <a:t>wiem</a:t>
+            </a:r>
+            <a:r>
+              <a:rPr lang="en-GB" dirty="0"/>
+              <a:t> jak </a:t>
+            </a:r>
+            <a:r>
+              <a:rPr lang="en-GB" dirty="0" err="1"/>
+              <a:t>wstawić</a:t>
+            </a:r>
+            <a:r>
+              <a:rPr lang="en-GB" dirty="0"/>
+              <a:t> </a:t>
+            </a:r>
+            <a:r>
+              <a:rPr lang="en-GB" dirty="0" err="1"/>
+              <a:t>liczbę</a:t>
+            </a:r>
+            <a:r>
+              <a:rPr lang="en-GB" dirty="0"/>
+              <a:t> </a:t>
+            </a:r>
+            <a:r>
+              <a:rPr lang="en-GB" dirty="0" err="1"/>
+              <a:t>porządkową</a:t>
+            </a:r>
+            <a:r>
+              <a:rPr lang="en-GB" dirty="0"/>
+              <a:t>, aby </a:t>
+            </a:r>
+            <a:r>
+              <a:rPr lang="en-GB" dirty="0" err="1"/>
+              <a:t>sprawdzić</a:t>
+            </a:r>
+            <a:r>
+              <a:rPr lang="en-GB" dirty="0"/>
+              <a:t>, </a:t>
+            </a:r>
+            <a:r>
+              <a:rPr lang="en-GB" dirty="0" err="1"/>
+              <a:t>kóre</a:t>
+            </a:r>
+            <a:r>
+              <a:rPr lang="en-GB" dirty="0"/>
+              <a:t> </a:t>
+            </a:r>
+            <a:r>
+              <a:rPr lang="en-GB" dirty="0" err="1"/>
+              <a:t>miejsce</a:t>
+            </a:r>
+            <a:r>
+              <a:rPr lang="en-GB" dirty="0"/>
+              <a:t> ma Polska</a:t>
+            </a:r>
           </a:p>
         </p:txBody>
       </p:sp>
     </p:spTree>
     <p:extLst>
       <p:ext uri="{BB962C8B-B14F-4D97-AF65-F5344CB8AC3E}">
-        <p14:creationId xmlns:p14="http://schemas.microsoft.com/office/powerpoint/2010/main" val="615412978"/>
+        <p14:creationId xmlns:p14="http://schemas.microsoft.com/office/powerpoint/2010/main" val="3681126194"/>
       </p:ext>
     </p:extLst>
   </p:cSld>
@@ -14851,6 +15879,1808 @@
     <p:extLst>
       <p:ext uri="{BB962C8B-B14F-4D97-AF65-F5344CB8AC3E}">
         <p14:creationId xmlns:p14="http://schemas.microsoft.com/office/powerpoint/2010/main" val="780632758"/>
+      </p:ext>
+    </p:extLst>
+  </p:cSld>
+  <p:clrMapOvr>
+    <a:masterClrMapping/>
+  </p:clrMapOvr>
+</p:sld>
+</file>
+
+<file path=ppt/slides/slide20.xml><?xml version="1.0" encoding="utf-8"?>
+<p:sld xmlns:a="http://schemas.openxmlformats.org/drawingml/2006/main" xmlns:r="http://schemas.openxmlformats.org/officeDocument/2006/relationships" xmlns:p="http://schemas.openxmlformats.org/presentationml/2006/main">
+  <p:cSld>
+    <p:spTree>
+      <p:nvGrpSpPr>
+        <p:cNvPr id="1" name=""/>
+        <p:cNvGrpSpPr/>
+        <p:nvPr/>
+      </p:nvGrpSpPr>
+      <p:grpSpPr>
+        <a:xfrm>
+          <a:off x="0" y="0"/>
+          <a:ext cx="0" cy="0"/>
+          <a:chOff x="0" y="0"/>
+          <a:chExt cx="0" cy="0"/>
+        </a:xfrm>
+      </p:grpSpPr>
+      <p:sp>
+        <p:nvSpPr>
+          <p:cNvPr id="2" name="Title 1">
+            <a:extLst>
+              <a:ext uri="{FF2B5EF4-FFF2-40B4-BE49-F238E27FC236}">
+                <a16:creationId xmlns:a16="http://schemas.microsoft.com/office/drawing/2014/main" id="{2B3D1658-8B98-8385-30F6-E442C1EA63FA}"/>
+              </a:ext>
+            </a:extLst>
+          </p:cNvPr>
+          <p:cNvSpPr>
+            <a:spLocks noGrp="1"/>
+          </p:cNvSpPr>
+          <p:nvPr>
+            <p:ph type="title"/>
+          </p:nvPr>
+        </p:nvSpPr>
+        <p:spPr>
+          <a:xfrm>
+            <a:off x="1110174" y="466650"/>
+            <a:ext cx="10769075" cy="509700"/>
+          </a:xfrm>
+        </p:spPr>
+        <p:txBody>
+          <a:bodyPr>
+            <a:normAutofit fontScale="90000"/>
+          </a:bodyPr>
+          <a:lstStyle/>
+          <a:p>
+            <a:r>
+              <a:rPr lang="en-GB" dirty="0" err="1"/>
+              <a:t>Średnia</a:t>
+            </a:r>
+            <a:r>
+              <a:rPr lang="en-GB" dirty="0"/>
+              <a:t> </a:t>
+            </a:r>
+            <a:r>
+              <a:rPr lang="en-GB" dirty="0" err="1"/>
+              <a:t>wyniku</a:t>
+            </a:r>
+            <a:r>
+              <a:rPr lang="en-GB" dirty="0"/>
+              <a:t> </a:t>
+            </a:r>
+            <a:r>
+              <a:rPr lang="en-GB" dirty="0" err="1"/>
+              <a:t>dla</a:t>
+            </a:r>
+            <a:r>
+              <a:rPr lang="en-GB" dirty="0"/>
+              <a:t> </a:t>
+            </a:r>
+            <a:r>
+              <a:rPr lang="en-GB" dirty="0" err="1"/>
+              <a:t>krajów</a:t>
+            </a:r>
+            <a:r>
+              <a:rPr lang="en-GB" dirty="0"/>
+              <a:t> </a:t>
+            </a:r>
+            <a:r>
+              <a:rPr lang="en-GB" dirty="0" err="1"/>
+              <a:t>na</a:t>
+            </a:r>
+            <a:r>
+              <a:rPr lang="en-GB" dirty="0"/>
+              <a:t> </a:t>
+            </a:r>
+            <a:r>
+              <a:rPr lang="en-GB" dirty="0" err="1"/>
+              <a:t>przestrzeni</a:t>
+            </a:r>
+            <a:r>
+              <a:rPr lang="en-GB" dirty="0"/>
+              <a:t> </a:t>
+            </a:r>
+            <a:r>
+              <a:rPr lang="en-GB" dirty="0" err="1"/>
+              <a:t>badanych</a:t>
+            </a:r>
+            <a:r>
+              <a:rPr lang="en-GB" dirty="0"/>
+              <a:t> </a:t>
+            </a:r>
+            <a:r>
+              <a:rPr lang="en-GB" dirty="0" err="1"/>
+              <a:t>lat</a:t>
+            </a:r>
+            <a:br>
+              <a:rPr lang="en-GB" dirty="0"/>
+            </a:br>
+            <a:endParaRPr lang="en-GB" dirty="0"/>
+          </a:p>
+        </p:txBody>
+      </p:sp>
+      <p:sp>
+        <p:nvSpPr>
+          <p:cNvPr id="3" name="Text Placeholder 2">
+            <a:extLst>
+              <a:ext uri="{FF2B5EF4-FFF2-40B4-BE49-F238E27FC236}">
+                <a16:creationId xmlns:a16="http://schemas.microsoft.com/office/drawing/2014/main" id="{BE531AF0-8DB5-A612-331A-2B7E2F00BF3B}"/>
+              </a:ext>
+            </a:extLst>
+          </p:cNvPr>
+          <p:cNvSpPr>
+            <a:spLocks noGrp="1"/>
+          </p:cNvSpPr>
+          <p:nvPr>
+            <p:ph type="body" idx="1"/>
+          </p:nvPr>
+        </p:nvSpPr>
+        <p:spPr>
+          <a:xfrm>
+            <a:off x="312750" y="1239900"/>
+            <a:ext cx="4148776" cy="4538100"/>
+          </a:xfrm>
+        </p:spPr>
+        <p:txBody>
+          <a:bodyPr/>
+          <a:lstStyle/>
+          <a:p>
+            <a:r>
+              <a:rPr lang="en-GB" dirty="0" err="1"/>
+              <a:t>Najmniej</a:t>
+            </a:r>
+            <a:r>
+              <a:rPr lang="en-GB" dirty="0"/>
+              <a:t> </a:t>
+            </a:r>
+            <a:r>
+              <a:rPr lang="en-GB" dirty="0" err="1"/>
+              <a:t>szczęśliwi</a:t>
+            </a:r>
+            <a:r>
+              <a:rPr lang="en-GB" dirty="0"/>
+              <a:t> </a:t>
+            </a:r>
+            <a:r>
+              <a:rPr lang="en-GB" dirty="0" err="1"/>
+              <a:t>są</a:t>
+            </a:r>
+            <a:r>
+              <a:rPr lang="en-GB" dirty="0"/>
+              <a:t> w </a:t>
+            </a:r>
+            <a:r>
+              <a:rPr lang="en-GB" dirty="0" err="1"/>
+              <a:t>kraju</a:t>
+            </a:r>
+            <a:r>
+              <a:rPr lang="en-GB" dirty="0"/>
+              <a:t> Burundi</a:t>
+            </a:r>
+          </a:p>
+        </p:txBody>
+      </p:sp>
+      <p:pic>
+        <p:nvPicPr>
+          <p:cNvPr id="6" name="Picture 5">
+            <a:extLst>
+              <a:ext uri="{FF2B5EF4-FFF2-40B4-BE49-F238E27FC236}">
+                <a16:creationId xmlns:a16="http://schemas.microsoft.com/office/drawing/2014/main" id="{4CF27DEC-AA1C-9C45-B5CC-0C248FD088C0}"/>
+              </a:ext>
+            </a:extLst>
+          </p:cNvPr>
+          <p:cNvPicPr>
+            <a:picLocks noChangeAspect="1"/>
+          </p:cNvPicPr>
+          <p:nvPr/>
+        </p:nvPicPr>
+        <p:blipFill>
+          <a:blip r:embed="rId2"/>
+          <a:stretch>
+            <a:fillRect/>
+          </a:stretch>
+        </p:blipFill>
+        <p:spPr>
+          <a:xfrm>
+            <a:off x="4461526" y="1239900"/>
+            <a:ext cx="7417723" cy="4413699"/>
+          </a:xfrm>
+          <a:prstGeom prst="rect">
+            <a:avLst/>
+          </a:prstGeom>
+        </p:spPr>
+      </p:pic>
+    </p:spTree>
+    <p:extLst>
+      <p:ext uri="{BB962C8B-B14F-4D97-AF65-F5344CB8AC3E}">
+        <p14:creationId xmlns:p14="http://schemas.microsoft.com/office/powerpoint/2010/main" val="2308506864"/>
+      </p:ext>
+    </p:extLst>
+  </p:cSld>
+  <p:clrMapOvr>
+    <a:masterClrMapping/>
+  </p:clrMapOvr>
+</p:sld>
+</file>
+
+<file path=ppt/slides/slide21.xml><?xml version="1.0" encoding="utf-8"?>
+<p:sld xmlns:a="http://schemas.openxmlformats.org/drawingml/2006/main" xmlns:r="http://schemas.openxmlformats.org/officeDocument/2006/relationships" xmlns:p="http://schemas.openxmlformats.org/presentationml/2006/main">
+  <p:cSld>
+    <p:spTree>
+      <p:nvGrpSpPr>
+        <p:cNvPr id="1" name=""/>
+        <p:cNvGrpSpPr/>
+        <p:nvPr/>
+      </p:nvGrpSpPr>
+      <p:grpSpPr>
+        <a:xfrm>
+          <a:off x="0" y="0"/>
+          <a:ext cx="0" cy="0"/>
+          <a:chOff x="0" y="0"/>
+          <a:chExt cx="0" cy="0"/>
+        </a:xfrm>
+      </p:grpSpPr>
+      <p:sp>
+        <p:nvSpPr>
+          <p:cNvPr id="2" name="Title 1">
+            <a:extLst>
+              <a:ext uri="{FF2B5EF4-FFF2-40B4-BE49-F238E27FC236}">
+                <a16:creationId xmlns:a16="http://schemas.microsoft.com/office/drawing/2014/main" id="{2B3D1658-8B98-8385-30F6-E442C1EA63FA}"/>
+              </a:ext>
+            </a:extLst>
+          </p:cNvPr>
+          <p:cNvSpPr>
+            <a:spLocks noGrp="1"/>
+          </p:cNvSpPr>
+          <p:nvPr>
+            <p:ph type="title"/>
+          </p:nvPr>
+        </p:nvSpPr>
+        <p:spPr>
+          <a:xfrm>
+            <a:off x="1110174" y="466650"/>
+            <a:ext cx="10769075" cy="509700"/>
+          </a:xfrm>
+        </p:spPr>
+        <p:txBody>
+          <a:bodyPr>
+            <a:normAutofit fontScale="90000"/>
+          </a:bodyPr>
+          <a:lstStyle/>
+          <a:p>
+            <a:r>
+              <a:rPr lang="en-GB" dirty="0" err="1"/>
+              <a:t>Zmiany</a:t>
+            </a:r>
+            <a:r>
+              <a:rPr lang="en-GB" dirty="0"/>
+              <a:t> </a:t>
+            </a:r>
+            <a:r>
+              <a:rPr lang="en-GB" dirty="0" err="1"/>
+              <a:t>na</a:t>
+            </a:r>
+            <a:r>
+              <a:rPr lang="en-GB" dirty="0"/>
+              <a:t> </a:t>
+            </a:r>
+            <a:r>
+              <a:rPr lang="en-GB" dirty="0" err="1"/>
+              <a:t>przestrzeni</a:t>
+            </a:r>
+            <a:r>
+              <a:rPr lang="en-GB" dirty="0"/>
+              <a:t> </a:t>
+            </a:r>
+            <a:r>
+              <a:rPr lang="en-GB" dirty="0" err="1"/>
+              <a:t>lat</a:t>
+            </a:r>
+            <a:r>
+              <a:rPr lang="en-GB" dirty="0"/>
+              <a:t> – </a:t>
+            </a:r>
+            <a:r>
+              <a:rPr lang="en-GB" dirty="0" err="1"/>
+              <a:t>bardziej</a:t>
+            </a:r>
+            <a:r>
+              <a:rPr lang="en-GB" dirty="0"/>
+              <a:t> </a:t>
+            </a:r>
+            <a:r>
+              <a:rPr lang="en-GB" dirty="0" err="1"/>
+              <a:t>znaczące</a:t>
+            </a:r>
+            <a:br>
+              <a:rPr lang="en-GB" dirty="0"/>
+            </a:br>
+            <a:endParaRPr lang="en-GB" dirty="0"/>
+          </a:p>
+        </p:txBody>
+      </p:sp>
+      <p:sp>
+        <p:nvSpPr>
+          <p:cNvPr id="3" name="Text Placeholder 2">
+            <a:extLst>
+              <a:ext uri="{FF2B5EF4-FFF2-40B4-BE49-F238E27FC236}">
+                <a16:creationId xmlns:a16="http://schemas.microsoft.com/office/drawing/2014/main" id="{BE531AF0-8DB5-A612-331A-2B7E2F00BF3B}"/>
+              </a:ext>
+            </a:extLst>
+          </p:cNvPr>
+          <p:cNvSpPr>
+            <a:spLocks noGrp="1"/>
+          </p:cNvSpPr>
+          <p:nvPr>
+            <p:ph type="body" idx="1"/>
+          </p:nvPr>
+        </p:nvSpPr>
+        <p:spPr>
+          <a:xfrm>
+            <a:off x="312750" y="1239900"/>
+            <a:ext cx="4297350" cy="4538100"/>
+          </a:xfrm>
+        </p:spPr>
+        <p:txBody>
+          <a:bodyPr/>
+          <a:lstStyle/>
+          <a:p>
+            <a:r>
+              <a:rPr lang="en-GB" dirty="0" err="1"/>
+              <a:t>Dla</a:t>
+            </a:r>
+            <a:r>
+              <a:rPr lang="en-GB" dirty="0"/>
+              <a:t> </a:t>
+            </a:r>
+            <a:r>
+              <a:rPr lang="en-GB" dirty="0" err="1"/>
+              <a:t>wszystkich</a:t>
+            </a:r>
+            <a:r>
+              <a:rPr lang="en-GB" dirty="0"/>
+              <a:t> </a:t>
+            </a:r>
+            <a:r>
+              <a:rPr lang="en-GB" dirty="0" err="1"/>
+              <a:t>regionów</a:t>
+            </a:r>
+            <a:r>
+              <a:rPr lang="en-GB" dirty="0"/>
+              <a:t> </a:t>
+            </a:r>
+            <a:r>
+              <a:rPr lang="en-GB" dirty="0" err="1"/>
+              <a:t>nie</a:t>
+            </a:r>
+            <a:r>
+              <a:rPr lang="en-GB" dirty="0"/>
+              <a:t> ma </a:t>
+            </a:r>
+            <a:r>
+              <a:rPr lang="en-GB" dirty="0" err="1"/>
+              <a:t>znaczących</a:t>
+            </a:r>
+            <a:r>
+              <a:rPr lang="en-GB" dirty="0"/>
+              <a:t> </a:t>
+            </a:r>
+            <a:r>
+              <a:rPr lang="en-GB" dirty="0" err="1"/>
+              <a:t>zmian</a:t>
+            </a:r>
+            <a:r>
+              <a:rPr lang="en-GB" dirty="0"/>
+              <a:t> </a:t>
+            </a:r>
+            <a:r>
+              <a:rPr lang="en-GB" dirty="0" err="1"/>
+              <a:t>na</a:t>
+            </a:r>
+            <a:r>
+              <a:rPr lang="en-GB" dirty="0"/>
+              <a:t> </a:t>
+            </a:r>
+            <a:r>
+              <a:rPr lang="en-GB" dirty="0" err="1"/>
+              <a:t>przestrzeni</a:t>
+            </a:r>
+            <a:r>
+              <a:rPr lang="en-GB" dirty="0"/>
+              <a:t> </a:t>
+            </a:r>
+            <a:r>
+              <a:rPr lang="en-GB" dirty="0" err="1"/>
+              <a:t>lat</a:t>
+            </a:r>
+            <a:endParaRPr lang="en-GB" dirty="0"/>
+          </a:p>
+          <a:p>
+            <a:r>
+              <a:rPr lang="en-GB" dirty="0" err="1"/>
+              <a:t>Dla</a:t>
+            </a:r>
+            <a:r>
+              <a:rPr lang="en-GB" dirty="0"/>
+              <a:t> </a:t>
+            </a:r>
+            <a:r>
+              <a:rPr lang="en-GB" dirty="0" err="1"/>
+              <a:t>poszczególnych</a:t>
+            </a:r>
+            <a:r>
+              <a:rPr lang="en-GB" dirty="0"/>
+              <a:t> </a:t>
+            </a:r>
+            <a:r>
+              <a:rPr lang="en-GB" dirty="0" err="1"/>
+              <a:t>regionów</a:t>
+            </a:r>
+            <a:r>
+              <a:rPr lang="en-GB" dirty="0"/>
+              <a:t> </a:t>
+            </a:r>
+            <a:r>
+              <a:rPr lang="en-GB" dirty="0" err="1"/>
+              <a:t>największe</a:t>
+            </a:r>
+            <a:r>
+              <a:rPr lang="en-GB" dirty="0"/>
+              <a:t> </a:t>
+            </a:r>
+            <a:r>
+              <a:rPr lang="en-GB" dirty="0" err="1"/>
+              <a:t>zmiany</a:t>
+            </a:r>
+            <a:r>
+              <a:rPr lang="en-GB" dirty="0"/>
+              <a:t> </a:t>
+            </a:r>
+            <a:r>
+              <a:rPr lang="en-GB" dirty="0" err="1"/>
+              <a:t>wystąpiły</a:t>
+            </a:r>
+            <a:r>
+              <a:rPr lang="en-GB" dirty="0"/>
+              <a:t> </a:t>
+            </a:r>
+            <a:r>
+              <a:rPr lang="en-GB" dirty="0" err="1"/>
+              <a:t>dla</a:t>
+            </a:r>
+            <a:r>
+              <a:rPr lang="en-GB" dirty="0"/>
+              <a:t>:</a:t>
+            </a:r>
+          </a:p>
+          <a:p>
+            <a:r>
+              <a:rPr lang="en-GB" dirty="0"/>
+              <a:t>Central &amp; Eastern Europe – </a:t>
+            </a:r>
+            <a:r>
+              <a:rPr lang="en-GB" dirty="0" err="1"/>
+              <a:t>wzrost</a:t>
+            </a:r>
+            <a:r>
+              <a:rPr lang="en-GB" dirty="0"/>
+              <a:t> o 0.23 </a:t>
+            </a:r>
+          </a:p>
+          <a:p>
+            <a:r>
+              <a:rPr lang="en-GB" dirty="0"/>
+              <a:t>Latin America &amp; </a:t>
+            </a:r>
+            <a:r>
+              <a:rPr lang="en-GB" dirty="0" err="1"/>
+              <a:t>Carribean</a:t>
+            </a:r>
+            <a:r>
+              <a:rPr lang="en-GB" dirty="0"/>
+              <a:t> – </a:t>
+            </a:r>
+            <a:r>
+              <a:rPr lang="en-GB" dirty="0" err="1"/>
+              <a:t>spadek</a:t>
+            </a:r>
+            <a:r>
+              <a:rPr lang="en-GB" dirty="0"/>
+              <a:t> o 0.19</a:t>
+            </a:r>
+          </a:p>
+          <a:p>
+            <a:r>
+              <a:rPr lang="en-GB" dirty="0"/>
+              <a:t>North America – </a:t>
+            </a:r>
+            <a:r>
+              <a:rPr lang="en-GB" dirty="0" err="1"/>
+              <a:t>spadek</a:t>
+            </a:r>
+            <a:r>
+              <a:rPr lang="en-GB" dirty="0"/>
+              <a:t> o 0.19</a:t>
+            </a:r>
+          </a:p>
+          <a:p>
+            <a:endParaRPr lang="en-GB" dirty="0"/>
+          </a:p>
+        </p:txBody>
+      </p:sp>
+      <p:pic>
+        <p:nvPicPr>
+          <p:cNvPr id="5" name="Picture 4">
+            <a:extLst>
+              <a:ext uri="{FF2B5EF4-FFF2-40B4-BE49-F238E27FC236}">
+                <a16:creationId xmlns:a16="http://schemas.microsoft.com/office/drawing/2014/main" id="{E63D7220-FEA2-22B5-331A-C31560068035}"/>
+              </a:ext>
+            </a:extLst>
+          </p:cNvPr>
+          <p:cNvPicPr>
+            <a:picLocks noChangeAspect="1"/>
+          </p:cNvPicPr>
+          <p:nvPr/>
+        </p:nvPicPr>
+        <p:blipFill>
+          <a:blip r:embed="rId2"/>
+          <a:stretch>
+            <a:fillRect/>
+          </a:stretch>
+        </p:blipFill>
+        <p:spPr>
+          <a:xfrm>
+            <a:off x="4920425" y="1542990"/>
+            <a:ext cx="6958824" cy="512936"/>
+          </a:xfrm>
+          <a:prstGeom prst="rect">
+            <a:avLst/>
+          </a:prstGeom>
+        </p:spPr>
+      </p:pic>
+      <p:pic>
+        <p:nvPicPr>
+          <p:cNvPr id="7" name="Picture 6">
+            <a:extLst>
+              <a:ext uri="{FF2B5EF4-FFF2-40B4-BE49-F238E27FC236}">
+                <a16:creationId xmlns:a16="http://schemas.microsoft.com/office/drawing/2014/main" id="{CA66F2F2-0DAD-4851-3EEC-5CEB8A4BDD7B}"/>
+              </a:ext>
+            </a:extLst>
+          </p:cNvPr>
+          <p:cNvPicPr>
+            <a:picLocks noChangeAspect="1"/>
+          </p:cNvPicPr>
+          <p:nvPr/>
+        </p:nvPicPr>
+        <p:blipFill>
+          <a:blip r:embed="rId3"/>
+          <a:stretch>
+            <a:fillRect/>
+          </a:stretch>
+        </p:blipFill>
+        <p:spPr>
+          <a:xfrm>
+            <a:off x="5010150" y="2340682"/>
+            <a:ext cx="6869099" cy="568164"/>
+          </a:xfrm>
+          <a:prstGeom prst="rect">
+            <a:avLst/>
+          </a:prstGeom>
+        </p:spPr>
+      </p:pic>
+      <p:pic>
+        <p:nvPicPr>
+          <p:cNvPr id="9" name="Picture 8">
+            <a:extLst>
+              <a:ext uri="{FF2B5EF4-FFF2-40B4-BE49-F238E27FC236}">
+                <a16:creationId xmlns:a16="http://schemas.microsoft.com/office/drawing/2014/main" id="{BB80BA4D-6EB9-A510-3F7F-BEDACA6B12AA}"/>
+              </a:ext>
+            </a:extLst>
+          </p:cNvPr>
+          <p:cNvPicPr>
+            <a:picLocks noChangeAspect="1"/>
+          </p:cNvPicPr>
+          <p:nvPr/>
+        </p:nvPicPr>
+        <p:blipFill>
+          <a:blip r:embed="rId4"/>
+          <a:stretch>
+            <a:fillRect/>
+          </a:stretch>
+        </p:blipFill>
+        <p:spPr>
+          <a:xfrm>
+            <a:off x="5019675" y="3208866"/>
+            <a:ext cx="6859574" cy="802289"/>
+          </a:xfrm>
+          <a:prstGeom prst="rect">
+            <a:avLst/>
+          </a:prstGeom>
+        </p:spPr>
+      </p:pic>
+    </p:spTree>
+    <p:extLst>
+      <p:ext uri="{BB962C8B-B14F-4D97-AF65-F5344CB8AC3E}">
+        <p14:creationId xmlns:p14="http://schemas.microsoft.com/office/powerpoint/2010/main" val="2227372352"/>
+      </p:ext>
+    </p:extLst>
+  </p:cSld>
+  <p:clrMapOvr>
+    <a:masterClrMapping/>
+  </p:clrMapOvr>
+</p:sld>
+</file>
+
+<file path=ppt/slides/slide22.xml><?xml version="1.0" encoding="utf-8"?>
+<p:sld xmlns:a="http://schemas.openxmlformats.org/drawingml/2006/main" xmlns:r="http://schemas.openxmlformats.org/officeDocument/2006/relationships" xmlns:p="http://schemas.openxmlformats.org/presentationml/2006/main">
+  <p:cSld>
+    <p:spTree>
+      <p:nvGrpSpPr>
+        <p:cNvPr id="1" name=""/>
+        <p:cNvGrpSpPr/>
+        <p:nvPr/>
+      </p:nvGrpSpPr>
+      <p:grpSpPr>
+        <a:xfrm>
+          <a:off x="0" y="0"/>
+          <a:ext cx="0" cy="0"/>
+          <a:chOff x="0" y="0"/>
+          <a:chExt cx="0" cy="0"/>
+        </a:xfrm>
+      </p:grpSpPr>
+      <p:sp>
+        <p:nvSpPr>
+          <p:cNvPr id="2" name="Title 1">
+            <a:extLst>
+              <a:ext uri="{FF2B5EF4-FFF2-40B4-BE49-F238E27FC236}">
+                <a16:creationId xmlns:a16="http://schemas.microsoft.com/office/drawing/2014/main" id="{2B3D1658-8B98-8385-30F6-E442C1EA63FA}"/>
+              </a:ext>
+            </a:extLst>
+          </p:cNvPr>
+          <p:cNvSpPr>
+            <a:spLocks noGrp="1"/>
+          </p:cNvSpPr>
+          <p:nvPr>
+            <p:ph type="title"/>
+          </p:nvPr>
+        </p:nvSpPr>
+        <p:spPr>
+          <a:xfrm>
+            <a:off x="1110174" y="466650"/>
+            <a:ext cx="10769075" cy="509700"/>
+          </a:xfrm>
+        </p:spPr>
+        <p:txBody>
+          <a:bodyPr>
+            <a:normAutofit fontScale="90000"/>
+          </a:bodyPr>
+          <a:lstStyle/>
+          <a:p>
+            <a:r>
+              <a:rPr lang="en-GB" dirty="0" err="1"/>
+              <a:t>Najszczęśliwsi</a:t>
+            </a:r>
+            <a:r>
+              <a:rPr lang="en-GB" dirty="0"/>
+              <a:t> – </a:t>
+            </a:r>
+            <a:r>
+              <a:rPr lang="en-GB" dirty="0" err="1"/>
+              <a:t>analiza</a:t>
+            </a:r>
+            <a:r>
+              <a:rPr lang="en-GB" dirty="0"/>
+              <a:t> Denmark</a:t>
+            </a:r>
+            <a:br>
+              <a:rPr lang="en-GB" dirty="0"/>
+            </a:br>
+            <a:endParaRPr lang="en-GB" dirty="0"/>
+          </a:p>
+        </p:txBody>
+      </p:sp>
+      <p:sp>
+        <p:nvSpPr>
+          <p:cNvPr id="3" name="Text Placeholder 2">
+            <a:extLst>
+              <a:ext uri="{FF2B5EF4-FFF2-40B4-BE49-F238E27FC236}">
+                <a16:creationId xmlns:a16="http://schemas.microsoft.com/office/drawing/2014/main" id="{BE531AF0-8DB5-A612-331A-2B7E2F00BF3B}"/>
+              </a:ext>
+            </a:extLst>
+          </p:cNvPr>
+          <p:cNvSpPr>
+            <a:spLocks noGrp="1"/>
+          </p:cNvSpPr>
+          <p:nvPr>
+            <p:ph type="body" idx="1"/>
+          </p:nvPr>
+        </p:nvSpPr>
+        <p:spPr>
+          <a:xfrm>
+            <a:off x="312750" y="1239900"/>
+            <a:ext cx="4297350" cy="4538100"/>
+          </a:xfrm>
+        </p:spPr>
+        <p:txBody>
+          <a:bodyPr/>
+          <a:lstStyle/>
+          <a:p>
+            <a:r>
+              <a:rPr lang="en-GB" dirty="0"/>
+              <a:t>…</a:t>
+            </a:r>
+          </a:p>
+          <a:p>
+            <a:endParaRPr lang="en-GB" dirty="0"/>
+          </a:p>
+        </p:txBody>
+      </p:sp>
+      <p:pic>
+        <p:nvPicPr>
+          <p:cNvPr id="4" name="Picture 3">
+            <a:extLst>
+              <a:ext uri="{FF2B5EF4-FFF2-40B4-BE49-F238E27FC236}">
+                <a16:creationId xmlns:a16="http://schemas.microsoft.com/office/drawing/2014/main" id="{AB7521B7-ED15-B779-1D3E-756589F28436}"/>
+              </a:ext>
+            </a:extLst>
+          </p:cNvPr>
+          <p:cNvPicPr>
+            <a:picLocks noChangeAspect="1"/>
+          </p:cNvPicPr>
+          <p:nvPr/>
+        </p:nvPicPr>
+        <p:blipFill>
+          <a:blip r:embed="rId2"/>
+          <a:stretch>
+            <a:fillRect/>
+          </a:stretch>
+        </p:blipFill>
+        <p:spPr>
+          <a:xfrm>
+            <a:off x="4288944" y="1080000"/>
+            <a:ext cx="7590305" cy="5172544"/>
+          </a:xfrm>
+          <a:prstGeom prst="rect">
+            <a:avLst/>
+          </a:prstGeom>
+          <a:ln>
+            <a:solidFill>
+              <a:schemeClr val="accent3"/>
+            </a:solidFill>
+          </a:ln>
+        </p:spPr>
+      </p:pic>
+    </p:spTree>
+    <p:extLst>
+      <p:ext uri="{BB962C8B-B14F-4D97-AF65-F5344CB8AC3E}">
+        <p14:creationId xmlns:p14="http://schemas.microsoft.com/office/powerpoint/2010/main" val="778414253"/>
+      </p:ext>
+    </p:extLst>
+  </p:cSld>
+  <p:clrMapOvr>
+    <a:masterClrMapping/>
+  </p:clrMapOvr>
+</p:sld>
+</file>
+
+<file path=ppt/slides/slide23.xml><?xml version="1.0" encoding="utf-8"?>
+<p:sld xmlns:a="http://schemas.openxmlformats.org/drawingml/2006/main" xmlns:r="http://schemas.openxmlformats.org/officeDocument/2006/relationships" xmlns:p="http://schemas.openxmlformats.org/presentationml/2006/main">
+  <p:cSld>
+    <p:spTree>
+      <p:nvGrpSpPr>
+        <p:cNvPr id="1" name=""/>
+        <p:cNvGrpSpPr/>
+        <p:nvPr/>
+      </p:nvGrpSpPr>
+      <p:grpSpPr>
+        <a:xfrm>
+          <a:off x="0" y="0"/>
+          <a:ext cx="0" cy="0"/>
+          <a:chOff x="0" y="0"/>
+          <a:chExt cx="0" cy="0"/>
+        </a:xfrm>
+      </p:grpSpPr>
+      <p:sp>
+        <p:nvSpPr>
+          <p:cNvPr id="2" name="Title 1">
+            <a:extLst>
+              <a:ext uri="{FF2B5EF4-FFF2-40B4-BE49-F238E27FC236}">
+                <a16:creationId xmlns:a16="http://schemas.microsoft.com/office/drawing/2014/main" id="{2B3D1658-8B98-8385-30F6-E442C1EA63FA}"/>
+              </a:ext>
+            </a:extLst>
+          </p:cNvPr>
+          <p:cNvSpPr>
+            <a:spLocks noGrp="1"/>
+          </p:cNvSpPr>
+          <p:nvPr>
+            <p:ph type="title"/>
+          </p:nvPr>
+        </p:nvSpPr>
+        <p:spPr>
+          <a:xfrm>
+            <a:off x="1110174" y="466650"/>
+            <a:ext cx="10769075" cy="509700"/>
+          </a:xfrm>
+        </p:spPr>
+        <p:txBody>
+          <a:bodyPr>
+            <a:normAutofit fontScale="90000"/>
+          </a:bodyPr>
+          <a:lstStyle/>
+          <a:p>
+            <a:r>
+              <a:rPr lang="en-GB" dirty="0" err="1"/>
+              <a:t>Najmniej</a:t>
+            </a:r>
+            <a:r>
+              <a:rPr lang="en-GB" dirty="0"/>
+              <a:t> </a:t>
+            </a:r>
+            <a:r>
+              <a:rPr lang="en-GB" dirty="0" err="1"/>
+              <a:t>szczęśliwi</a:t>
+            </a:r>
+            <a:r>
+              <a:rPr lang="en-GB" dirty="0"/>
+              <a:t> – </a:t>
+            </a:r>
+            <a:r>
+              <a:rPr lang="en-GB" dirty="0" err="1"/>
+              <a:t>analiza</a:t>
+            </a:r>
+            <a:r>
+              <a:rPr lang="en-GB" dirty="0"/>
+              <a:t> Burundi</a:t>
+            </a:r>
+            <a:br>
+              <a:rPr lang="en-GB" dirty="0"/>
+            </a:br>
+            <a:endParaRPr lang="en-GB" dirty="0"/>
+          </a:p>
+        </p:txBody>
+      </p:sp>
+      <p:sp>
+        <p:nvSpPr>
+          <p:cNvPr id="3" name="Text Placeholder 2">
+            <a:extLst>
+              <a:ext uri="{FF2B5EF4-FFF2-40B4-BE49-F238E27FC236}">
+                <a16:creationId xmlns:a16="http://schemas.microsoft.com/office/drawing/2014/main" id="{BE531AF0-8DB5-A612-331A-2B7E2F00BF3B}"/>
+              </a:ext>
+            </a:extLst>
+          </p:cNvPr>
+          <p:cNvSpPr>
+            <a:spLocks noGrp="1"/>
+          </p:cNvSpPr>
+          <p:nvPr>
+            <p:ph type="body" idx="1"/>
+          </p:nvPr>
+        </p:nvSpPr>
+        <p:spPr>
+          <a:xfrm>
+            <a:off x="312750" y="1239900"/>
+            <a:ext cx="4297350" cy="4538100"/>
+          </a:xfrm>
+        </p:spPr>
+        <p:txBody>
+          <a:bodyPr/>
+          <a:lstStyle/>
+          <a:p>
+            <a:r>
+              <a:rPr lang="en-GB" dirty="0"/>
+              <a:t>…</a:t>
+            </a:r>
+          </a:p>
+          <a:p>
+            <a:endParaRPr lang="en-GB" dirty="0"/>
+          </a:p>
+        </p:txBody>
+      </p:sp>
+      <p:pic>
+        <p:nvPicPr>
+          <p:cNvPr id="6" name="Picture 5">
+            <a:extLst>
+              <a:ext uri="{FF2B5EF4-FFF2-40B4-BE49-F238E27FC236}">
+                <a16:creationId xmlns:a16="http://schemas.microsoft.com/office/drawing/2014/main" id="{2CC36D20-77E2-109E-738A-6EACE8CC7FE3}"/>
+              </a:ext>
+            </a:extLst>
+          </p:cNvPr>
+          <p:cNvPicPr>
+            <a:picLocks noChangeAspect="1"/>
+          </p:cNvPicPr>
+          <p:nvPr/>
+        </p:nvPicPr>
+        <p:blipFill>
+          <a:blip r:embed="rId2"/>
+          <a:stretch>
+            <a:fillRect/>
+          </a:stretch>
+        </p:blipFill>
+        <p:spPr>
+          <a:xfrm>
+            <a:off x="4288943" y="1079999"/>
+            <a:ext cx="7590305" cy="5180218"/>
+          </a:xfrm>
+          <a:prstGeom prst="rect">
+            <a:avLst/>
+          </a:prstGeom>
+          <a:ln>
+            <a:solidFill>
+              <a:schemeClr val="accent3"/>
+            </a:solidFill>
+          </a:ln>
+        </p:spPr>
+      </p:pic>
+    </p:spTree>
+    <p:extLst>
+      <p:ext uri="{BB962C8B-B14F-4D97-AF65-F5344CB8AC3E}">
+        <p14:creationId xmlns:p14="http://schemas.microsoft.com/office/powerpoint/2010/main" val="3279099634"/>
+      </p:ext>
+    </p:extLst>
+  </p:cSld>
+  <p:clrMapOvr>
+    <a:masterClrMapping/>
+  </p:clrMapOvr>
+</p:sld>
+</file>
+
+<file path=ppt/slides/slide24.xml><?xml version="1.0" encoding="utf-8"?>
+<p:sld xmlns:a="http://schemas.openxmlformats.org/drawingml/2006/main" xmlns:r="http://schemas.openxmlformats.org/officeDocument/2006/relationships" xmlns:p="http://schemas.openxmlformats.org/presentationml/2006/main">
+  <p:cSld>
+    <p:spTree>
+      <p:nvGrpSpPr>
+        <p:cNvPr id="1" name=""/>
+        <p:cNvGrpSpPr/>
+        <p:nvPr/>
+      </p:nvGrpSpPr>
+      <p:grpSpPr>
+        <a:xfrm>
+          <a:off x="0" y="0"/>
+          <a:ext cx="0" cy="0"/>
+          <a:chOff x="0" y="0"/>
+          <a:chExt cx="0" cy="0"/>
+        </a:xfrm>
+      </p:grpSpPr>
+      <p:sp>
+        <p:nvSpPr>
+          <p:cNvPr id="2" name="Title 1">
+            <a:extLst>
+              <a:ext uri="{FF2B5EF4-FFF2-40B4-BE49-F238E27FC236}">
+                <a16:creationId xmlns:a16="http://schemas.microsoft.com/office/drawing/2014/main" id="{2B3D1658-8B98-8385-30F6-E442C1EA63FA}"/>
+              </a:ext>
+            </a:extLst>
+          </p:cNvPr>
+          <p:cNvSpPr>
+            <a:spLocks noGrp="1"/>
+          </p:cNvSpPr>
+          <p:nvPr>
+            <p:ph type="title"/>
+          </p:nvPr>
+        </p:nvSpPr>
+        <p:spPr>
+          <a:xfrm>
+            <a:off x="1110174" y="466650"/>
+            <a:ext cx="10769075" cy="509700"/>
+          </a:xfrm>
+        </p:spPr>
+        <p:txBody>
+          <a:bodyPr>
+            <a:normAutofit fontScale="90000"/>
+          </a:bodyPr>
+          <a:lstStyle/>
+          <a:p>
+            <a:r>
+              <a:rPr lang="en-GB" dirty="0"/>
+              <a:t>Polska – </a:t>
+            </a:r>
+            <a:r>
+              <a:rPr lang="en-GB" dirty="0" err="1"/>
+              <a:t>analiza</a:t>
+            </a:r>
+            <a:r>
+              <a:rPr lang="en-GB" dirty="0"/>
+              <a:t> …</a:t>
+            </a:r>
+            <a:br>
+              <a:rPr lang="en-GB" dirty="0"/>
+            </a:br>
+            <a:endParaRPr lang="en-GB" dirty="0"/>
+          </a:p>
+        </p:txBody>
+      </p:sp>
+      <p:sp>
+        <p:nvSpPr>
+          <p:cNvPr id="3" name="Text Placeholder 2">
+            <a:extLst>
+              <a:ext uri="{FF2B5EF4-FFF2-40B4-BE49-F238E27FC236}">
+                <a16:creationId xmlns:a16="http://schemas.microsoft.com/office/drawing/2014/main" id="{BE531AF0-8DB5-A612-331A-2B7E2F00BF3B}"/>
+              </a:ext>
+            </a:extLst>
+          </p:cNvPr>
+          <p:cNvSpPr>
+            <a:spLocks noGrp="1"/>
+          </p:cNvSpPr>
+          <p:nvPr>
+            <p:ph type="body" idx="1"/>
+          </p:nvPr>
+        </p:nvSpPr>
+        <p:spPr>
+          <a:xfrm>
+            <a:off x="312750" y="1239900"/>
+            <a:ext cx="4297350" cy="4538100"/>
+          </a:xfrm>
+        </p:spPr>
+        <p:txBody>
+          <a:bodyPr/>
+          <a:lstStyle/>
+          <a:p>
+            <a:r>
+              <a:rPr lang="en-GB" dirty="0"/>
+              <a:t>…</a:t>
+            </a:r>
+          </a:p>
+          <a:p>
+            <a:endParaRPr lang="en-GB" dirty="0"/>
+          </a:p>
+        </p:txBody>
+      </p:sp>
+      <p:pic>
+        <p:nvPicPr>
+          <p:cNvPr id="6" name="Picture 5">
+            <a:extLst>
+              <a:ext uri="{FF2B5EF4-FFF2-40B4-BE49-F238E27FC236}">
+                <a16:creationId xmlns:a16="http://schemas.microsoft.com/office/drawing/2014/main" id="{ABAA5B06-9001-C06C-4922-84754C0340DA}"/>
+              </a:ext>
+            </a:extLst>
+          </p:cNvPr>
+          <p:cNvPicPr>
+            <a:picLocks noChangeAspect="1"/>
+          </p:cNvPicPr>
+          <p:nvPr/>
+        </p:nvPicPr>
+        <p:blipFill>
+          <a:blip r:embed="rId2"/>
+          <a:stretch>
+            <a:fillRect/>
+          </a:stretch>
+        </p:blipFill>
+        <p:spPr>
+          <a:xfrm>
+            <a:off x="4288944" y="1080000"/>
+            <a:ext cx="7590305" cy="5163473"/>
+          </a:xfrm>
+          <a:prstGeom prst="rect">
+            <a:avLst/>
+          </a:prstGeom>
+          <a:ln>
+            <a:solidFill>
+              <a:schemeClr val="accent3"/>
+            </a:solidFill>
+          </a:ln>
+        </p:spPr>
+      </p:pic>
+    </p:spTree>
+    <p:extLst>
+      <p:ext uri="{BB962C8B-B14F-4D97-AF65-F5344CB8AC3E}">
+        <p14:creationId xmlns:p14="http://schemas.microsoft.com/office/powerpoint/2010/main" val="703707793"/>
+      </p:ext>
+    </p:extLst>
+  </p:cSld>
+  <p:clrMapOvr>
+    <a:masterClrMapping/>
+  </p:clrMapOvr>
+</p:sld>
+</file>
+
+<file path=ppt/slides/slide25.xml><?xml version="1.0" encoding="utf-8"?>
+<p:sld xmlns:a="http://schemas.openxmlformats.org/drawingml/2006/main" xmlns:r="http://schemas.openxmlformats.org/officeDocument/2006/relationships" xmlns:p="http://schemas.openxmlformats.org/presentationml/2006/main">
+  <p:cSld>
+    <p:spTree>
+      <p:nvGrpSpPr>
+        <p:cNvPr id="1" name=""/>
+        <p:cNvGrpSpPr/>
+        <p:nvPr/>
+      </p:nvGrpSpPr>
+      <p:grpSpPr>
+        <a:xfrm>
+          <a:off x="0" y="0"/>
+          <a:ext cx="0" cy="0"/>
+          <a:chOff x="0" y="0"/>
+          <a:chExt cx="0" cy="0"/>
+        </a:xfrm>
+      </p:grpSpPr>
+      <p:sp>
+        <p:nvSpPr>
+          <p:cNvPr id="2" name="Title 1">
+            <a:extLst>
+              <a:ext uri="{FF2B5EF4-FFF2-40B4-BE49-F238E27FC236}">
+                <a16:creationId xmlns:a16="http://schemas.microsoft.com/office/drawing/2014/main" id="{2B3D1658-8B98-8385-30F6-E442C1EA63FA}"/>
+              </a:ext>
+            </a:extLst>
+          </p:cNvPr>
+          <p:cNvSpPr>
+            <a:spLocks noGrp="1"/>
+          </p:cNvSpPr>
+          <p:nvPr>
+            <p:ph type="title"/>
+          </p:nvPr>
+        </p:nvSpPr>
+        <p:spPr>
+          <a:xfrm>
+            <a:off x="1110174" y="466650"/>
+            <a:ext cx="10769075" cy="509700"/>
+          </a:xfrm>
+        </p:spPr>
+        <p:txBody>
+          <a:bodyPr>
+            <a:normAutofit fontScale="90000"/>
+          </a:bodyPr>
+          <a:lstStyle/>
+          <a:p>
+            <a:r>
+              <a:rPr lang="en-GB" dirty="0"/>
+              <a:t>GPT per capita </a:t>
+            </a:r>
+            <a:r>
+              <a:rPr lang="en-GB" dirty="0" err="1"/>
+              <a:t>dla</a:t>
+            </a:r>
+            <a:r>
+              <a:rPr lang="en-GB" dirty="0"/>
+              <a:t> </a:t>
+            </a:r>
+            <a:r>
+              <a:rPr lang="en-GB" dirty="0" err="1"/>
+              <a:t>wyników</a:t>
+            </a:r>
+            <a:r>
+              <a:rPr lang="en-GB" dirty="0"/>
+              <a:t> max </a:t>
+            </a:r>
+            <a:r>
+              <a:rPr lang="en-GB" dirty="0" err="1"/>
+              <a:t>i</a:t>
+            </a:r>
+            <a:r>
+              <a:rPr lang="en-GB" dirty="0"/>
+              <a:t> min</a:t>
+            </a:r>
+            <a:br>
+              <a:rPr lang="en-GB" dirty="0"/>
+            </a:br>
+            <a:endParaRPr lang="en-GB" dirty="0"/>
+          </a:p>
+        </p:txBody>
+      </p:sp>
+      <p:sp>
+        <p:nvSpPr>
+          <p:cNvPr id="3" name="Text Placeholder 2">
+            <a:extLst>
+              <a:ext uri="{FF2B5EF4-FFF2-40B4-BE49-F238E27FC236}">
+                <a16:creationId xmlns:a16="http://schemas.microsoft.com/office/drawing/2014/main" id="{BE531AF0-8DB5-A612-331A-2B7E2F00BF3B}"/>
+              </a:ext>
+            </a:extLst>
+          </p:cNvPr>
+          <p:cNvSpPr>
+            <a:spLocks noGrp="1"/>
+          </p:cNvSpPr>
+          <p:nvPr>
+            <p:ph type="body" idx="1"/>
+          </p:nvPr>
+        </p:nvSpPr>
+        <p:spPr>
+          <a:xfrm>
+            <a:off x="312750" y="1239900"/>
+            <a:ext cx="11383950" cy="4538100"/>
+          </a:xfrm>
+        </p:spPr>
+        <p:txBody>
+          <a:bodyPr/>
+          <a:lstStyle/>
+          <a:p>
+            <a:r>
+              <a:rPr lang="en-GB" dirty="0"/>
+              <a:t>W </a:t>
+            </a:r>
+            <a:r>
+              <a:rPr lang="en-GB" dirty="0" err="1"/>
+              <a:t>przypadku</a:t>
+            </a:r>
+            <a:r>
+              <a:rPr lang="en-GB" dirty="0"/>
+              <a:t> </a:t>
+            </a:r>
+            <a:r>
+              <a:rPr lang="en-GB" dirty="0" err="1"/>
+              <a:t>najszczęśliwszego</a:t>
+            </a:r>
+            <a:r>
+              <a:rPr lang="en-GB" dirty="0"/>
+              <a:t> </a:t>
+            </a:r>
+            <a:r>
+              <a:rPr lang="en-GB" dirty="0" err="1"/>
+              <a:t>kraju</a:t>
+            </a:r>
+            <a:r>
+              <a:rPr lang="en-GB" dirty="0"/>
+              <a:t> </a:t>
+            </a:r>
+            <a:r>
+              <a:rPr lang="en-GB" dirty="0" err="1"/>
+              <a:t>zmiany</a:t>
+            </a:r>
+            <a:r>
+              <a:rPr lang="en-GB" dirty="0"/>
+              <a:t> w GPT per capita </a:t>
+            </a:r>
+            <a:r>
+              <a:rPr lang="en-GB" dirty="0" err="1"/>
+              <a:t>teoretycznie</a:t>
+            </a:r>
+            <a:r>
+              <a:rPr lang="en-GB" dirty="0"/>
+              <a:t> </a:t>
+            </a:r>
+            <a:r>
+              <a:rPr lang="en-GB" dirty="0" err="1"/>
+              <a:t>nie</a:t>
+            </a:r>
+            <a:r>
+              <a:rPr lang="en-GB" dirty="0"/>
+              <a:t> </a:t>
+            </a:r>
+            <a:r>
+              <a:rPr lang="en-GB" dirty="0" err="1"/>
+              <a:t>wpłynęły</a:t>
+            </a:r>
+            <a:r>
+              <a:rPr lang="en-GB" dirty="0"/>
+              <a:t> </a:t>
+            </a:r>
+            <a:r>
+              <a:rPr lang="en-GB" dirty="0" err="1"/>
+              <a:t>bezpośrednio</a:t>
+            </a:r>
+            <a:r>
+              <a:rPr lang="en-GB" dirty="0"/>
+              <a:t> </a:t>
+            </a:r>
+            <a:r>
+              <a:rPr lang="en-GB" dirty="0" err="1"/>
+              <a:t>na</a:t>
+            </a:r>
+            <a:r>
+              <a:rPr lang="en-GB" dirty="0"/>
+              <a:t> </a:t>
+            </a:r>
+            <a:r>
+              <a:rPr lang="en-GB" dirty="0" err="1"/>
+              <a:t>wynik</a:t>
+            </a:r>
+            <a:r>
+              <a:rPr lang="en-GB" dirty="0"/>
+              <a:t> </a:t>
+            </a:r>
+            <a:r>
+              <a:rPr lang="en-GB" dirty="0" err="1"/>
+              <a:t>finalny</a:t>
+            </a:r>
+            <a:r>
+              <a:rPr lang="en-GB" dirty="0"/>
+              <a:t>, </a:t>
+            </a:r>
+            <a:r>
+              <a:rPr lang="en-GB" dirty="0" err="1"/>
+              <a:t>podobnie</a:t>
+            </a:r>
+            <a:r>
+              <a:rPr lang="en-GB" dirty="0"/>
+              <a:t> w </a:t>
+            </a:r>
+            <a:r>
+              <a:rPr lang="en-GB" dirty="0" err="1"/>
+              <a:t>przypadku</a:t>
+            </a:r>
+            <a:r>
+              <a:rPr lang="en-GB" dirty="0"/>
+              <a:t> </a:t>
+            </a:r>
+            <a:r>
+              <a:rPr lang="en-GB" dirty="0" err="1"/>
+              <a:t>kraju</a:t>
+            </a:r>
+            <a:r>
+              <a:rPr lang="en-GB" dirty="0"/>
+              <a:t> </a:t>
+            </a:r>
+            <a:r>
+              <a:rPr lang="en-GB" dirty="0" err="1"/>
+              <a:t>najmniej</a:t>
+            </a:r>
+            <a:r>
+              <a:rPr lang="en-GB" dirty="0"/>
+              <a:t> </a:t>
+            </a:r>
+            <a:r>
+              <a:rPr lang="en-GB" dirty="0" err="1"/>
+              <a:t>szczęśliwego</a:t>
+            </a:r>
+            <a:endParaRPr lang="en-GB" dirty="0"/>
+          </a:p>
+          <a:p>
+            <a:endParaRPr lang="en-GB" dirty="0"/>
+          </a:p>
+          <a:p>
+            <a:endParaRPr lang="en-GB" dirty="0"/>
+          </a:p>
+        </p:txBody>
+      </p:sp>
+      <p:pic>
+        <p:nvPicPr>
+          <p:cNvPr id="10" name="Picture 9">
+            <a:extLst>
+              <a:ext uri="{FF2B5EF4-FFF2-40B4-BE49-F238E27FC236}">
+                <a16:creationId xmlns:a16="http://schemas.microsoft.com/office/drawing/2014/main" id="{8B3A24C2-4256-1BF5-EFF1-5529ACE1FC3E}"/>
+              </a:ext>
+            </a:extLst>
+          </p:cNvPr>
+          <p:cNvPicPr>
+            <a:picLocks noChangeAspect="1"/>
+          </p:cNvPicPr>
+          <p:nvPr/>
+        </p:nvPicPr>
+        <p:blipFill>
+          <a:blip r:embed="rId2"/>
+          <a:stretch>
+            <a:fillRect/>
+          </a:stretch>
+        </p:blipFill>
+        <p:spPr>
+          <a:xfrm>
+            <a:off x="6781116" y="3061898"/>
+            <a:ext cx="4894579" cy="3329452"/>
+          </a:xfrm>
+          <a:prstGeom prst="rect">
+            <a:avLst/>
+          </a:prstGeom>
+          <a:ln>
+            <a:solidFill>
+              <a:schemeClr val="accent3"/>
+            </a:solidFill>
+          </a:ln>
+        </p:spPr>
+      </p:pic>
+      <p:pic>
+        <p:nvPicPr>
+          <p:cNvPr id="12" name="Picture 11">
+            <a:extLst>
+              <a:ext uri="{FF2B5EF4-FFF2-40B4-BE49-F238E27FC236}">
+                <a16:creationId xmlns:a16="http://schemas.microsoft.com/office/drawing/2014/main" id="{91FD9670-FD9C-8514-845D-7BD7A75FCE0C}"/>
+              </a:ext>
+            </a:extLst>
+          </p:cNvPr>
+          <p:cNvPicPr>
+            <a:picLocks noChangeAspect="1"/>
+          </p:cNvPicPr>
+          <p:nvPr/>
+        </p:nvPicPr>
+        <p:blipFill>
+          <a:blip r:embed="rId3"/>
+          <a:stretch>
+            <a:fillRect/>
+          </a:stretch>
+        </p:blipFill>
+        <p:spPr>
+          <a:xfrm>
+            <a:off x="495300" y="3061898"/>
+            <a:ext cx="4915586" cy="3329452"/>
+          </a:xfrm>
+          <a:prstGeom prst="rect">
+            <a:avLst/>
+          </a:prstGeom>
+          <a:ln>
+            <a:solidFill>
+              <a:schemeClr val="accent3"/>
+            </a:solidFill>
+          </a:ln>
+        </p:spPr>
+      </p:pic>
+    </p:spTree>
+    <p:extLst>
+      <p:ext uri="{BB962C8B-B14F-4D97-AF65-F5344CB8AC3E}">
+        <p14:creationId xmlns:p14="http://schemas.microsoft.com/office/powerpoint/2010/main" val="1541875982"/>
+      </p:ext>
+    </p:extLst>
+  </p:cSld>
+  <p:clrMapOvr>
+    <a:masterClrMapping/>
+  </p:clrMapOvr>
+</p:sld>
+</file>
+
+<file path=ppt/slides/slide26.xml><?xml version="1.0" encoding="utf-8"?>
+<p:sld xmlns:a="http://schemas.openxmlformats.org/drawingml/2006/main" xmlns:r="http://schemas.openxmlformats.org/officeDocument/2006/relationships" xmlns:p="http://schemas.openxmlformats.org/presentationml/2006/main">
+  <p:cSld>
+    <p:spTree>
+      <p:nvGrpSpPr>
+        <p:cNvPr id="1" name=""/>
+        <p:cNvGrpSpPr/>
+        <p:nvPr/>
+      </p:nvGrpSpPr>
+      <p:grpSpPr>
+        <a:xfrm>
+          <a:off x="0" y="0"/>
+          <a:ext cx="0" cy="0"/>
+          <a:chOff x="0" y="0"/>
+          <a:chExt cx="0" cy="0"/>
+        </a:xfrm>
+      </p:grpSpPr>
+      <p:sp>
+        <p:nvSpPr>
+          <p:cNvPr id="2" name="Title 1">
+            <a:extLst>
+              <a:ext uri="{FF2B5EF4-FFF2-40B4-BE49-F238E27FC236}">
+                <a16:creationId xmlns:a16="http://schemas.microsoft.com/office/drawing/2014/main" id="{2B3D1658-8B98-8385-30F6-E442C1EA63FA}"/>
+              </a:ext>
+            </a:extLst>
+          </p:cNvPr>
+          <p:cNvSpPr>
+            <a:spLocks noGrp="1"/>
+          </p:cNvSpPr>
+          <p:nvPr>
+            <p:ph type="title"/>
+          </p:nvPr>
+        </p:nvSpPr>
+        <p:spPr>
+          <a:xfrm>
+            <a:off x="1110174" y="466650"/>
+            <a:ext cx="10769075" cy="509700"/>
+          </a:xfrm>
+        </p:spPr>
+        <p:txBody>
+          <a:bodyPr>
+            <a:normAutofit fontScale="90000"/>
+          </a:bodyPr>
+          <a:lstStyle/>
+          <a:p>
+            <a:r>
+              <a:rPr lang="en-GB" dirty="0"/>
+              <a:t>Freedom </a:t>
+            </a:r>
+            <a:r>
+              <a:rPr lang="en-GB" dirty="0" err="1"/>
+              <a:t>dla</a:t>
+            </a:r>
+            <a:r>
+              <a:rPr lang="en-GB" dirty="0"/>
+              <a:t> </a:t>
+            </a:r>
+            <a:r>
+              <a:rPr lang="en-GB" dirty="0" err="1"/>
+              <a:t>wyników</a:t>
+            </a:r>
+            <a:r>
+              <a:rPr lang="en-GB" dirty="0"/>
+              <a:t> max </a:t>
+            </a:r>
+            <a:r>
+              <a:rPr lang="en-GB" dirty="0" err="1"/>
+              <a:t>i</a:t>
+            </a:r>
+            <a:r>
+              <a:rPr lang="en-GB" dirty="0"/>
+              <a:t> min</a:t>
+            </a:r>
+            <a:br>
+              <a:rPr lang="en-GB" dirty="0"/>
+            </a:br>
+            <a:endParaRPr lang="en-GB" dirty="0"/>
+          </a:p>
+        </p:txBody>
+      </p:sp>
+      <p:sp>
+        <p:nvSpPr>
+          <p:cNvPr id="3" name="Text Placeholder 2">
+            <a:extLst>
+              <a:ext uri="{FF2B5EF4-FFF2-40B4-BE49-F238E27FC236}">
+                <a16:creationId xmlns:a16="http://schemas.microsoft.com/office/drawing/2014/main" id="{BE531AF0-8DB5-A612-331A-2B7E2F00BF3B}"/>
+              </a:ext>
+            </a:extLst>
+          </p:cNvPr>
+          <p:cNvSpPr>
+            <a:spLocks noGrp="1"/>
+          </p:cNvSpPr>
+          <p:nvPr>
+            <p:ph type="body" idx="1"/>
+          </p:nvPr>
+        </p:nvSpPr>
+        <p:spPr>
+          <a:xfrm>
+            <a:off x="312750" y="1239900"/>
+            <a:ext cx="11383950" cy="4538100"/>
+          </a:xfrm>
+        </p:spPr>
+        <p:txBody>
+          <a:bodyPr/>
+          <a:lstStyle/>
+          <a:p>
+            <a:r>
+              <a:rPr lang="en-GB" dirty="0"/>
+              <a:t>W </a:t>
+            </a:r>
+            <a:r>
+              <a:rPr lang="en-GB" dirty="0" err="1"/>
+              <a:t>przypadku</a:t>
+            </a:r>
+            <a:r>
+              <a:rPr lang="en-GB" dirty="0"/>
+              <a:t> </a:t>
+            </a:r>
+            <a:r>
+              <a:rPr lang="en-GB" dirty="0" err="1"/>
+              <a:t>najszczęśliwszego</a:t>
+            </a:r>
+            <a:r>
+              <a:rPr lang="en-GB" dirty="0"/>
+              <a:t> </a:t>
+            </a:r>
+            <a:r>
+              <a:rPr lang="en-GB" dirty="0" err="1"/>
+              <a:t>kraju</a:t>
+            </a:r>
+            <a:r>
+              <a:rPr lang="en-GB" dirty="0"/>
+              <a:t> </a:t>
+            </a:r>
+            <a:r>
+              <a:rPr lang="en-GB" dirty="0" err="1"/>
+              <a:t>zmiany</a:t>
+            </a:r>
+            <a:r>
+              <a:rPr lang="en-GB" dirty="0"/>
+              <a:t> w GPT per capita </a:t>
+            </a:r>
+            <a:r>
+              <a:rPr lang="en-GB" dirty="0" err="1"/>
+              <a:t>teoretycznie</a:t>
+            </a:r>
+            <a:r>
+              <a:rPr lang="en-GB" dirty="0"/>
+              <a:t> </a:t>
+            </a:r>
+            <a:r>
+              <a:rPr lang="en-GB" dirty="0" err="1"/>
+              <a:t>nie</a:t>
+            </a:r>
+            <a:r>
+              <a:rPr lang="en-GB" dirty="0"/>
+              <a:t> </a:t>
+            </a:r>
+            <a:r>
+              <a:rPr lang="en-GB" dirty="0" err="1"/>
+              <a:t>wpłynęły</a:t>
+            </a:r>
+            <a:r>
+              <a:rPr lang="en-GB" dirty="0"/>
+              <a:t> </a:t>
+            </a:r>
+            <a:r>
+              <a:rPr lang="en-GB" dirty="0" err="1"/>
+              <a:t>bezpośrednio</a:t>
+            </a:r>
+            <a:r>
+              <a:rPr lang="en-GB" dirty="0"/>
+              <a:t> </a:t>
+            </a:r>
+            <a:r>
+              <a:rPr lang="en-GB" dirty="0" err="1"/>
+              <a:t>na</a:t>
+            </a:r>
+            <a:r>
+              <a:rPr lang="en-GB" dirty="0"/>
+              <a:t> </a:t>
+            </a:r>
+            <a:r>
+              <a:rPr lang="en-GB" dirty="0" err="1"/>
+              <a:t>wynik</a:t>
+            </a:r>
+            <a:r>
+              <a:rPr lang="en-GB" dirty="0"/>
+              <a:t> </a:t>
+            </a:r>
+            <a:r>
+              <a:rPr lang="en-GB" dirty="0" err="1"/>
+              <a:t>finalny</a:t>
+            </a:r>
+            <a:r>
+              <a:rPr lang="en-GB" dirty="0"/>
+              <a:t>, </a:t>
+            </a:r>
+            <a:r>
+              <a:rPr lang="en-GB" dirty="0" err="1"/>
+              <a:t>podobnie</a:t>
+            </a:r>
+            <a:r>
+              <a:rPr lang="en-GB" dirty="0"/>
+              <a:t> w </a:t>
+            </a:r>
+            <a:r>
+              <a:rPr lang="en-GB" dirty="0" err="1"/>
+              <a:t>przypadku</a:t>
+            </a:r>
+            <a:r>
+              <a:rPr lang="en-GB" dirty="0"/>
+              <a:t> </a:t>
+            </a:r>
+            <a:r>
+              <a:rPr lang="en-GB" dirty="0" err="1"/>
+              <a:t>kraju</a:t>
+            </a:r>
+            <a:r>
+              <a:rPr lang="en-GB" dirty="0"/>
+              <a:t> </a:t>
+            </a:r>
+            <a:r>
+              <a:rPr lang="en-GB" dirty="0" err="1"/>
+              <a:t>najmniej</a:t>
+            </a:r>
+            <a:r>
+              <a:rPr lang="en-GB" dirty="0"/>
+              <a:t> </a:t>
+            </a:r>
+            <a:r>
+              <a:rPr lang="en-GB" dirty="0" err="1"/>
+              <a:t>szczęśliwego</a:t>
+            </a:r>
+            <a:endParaRPr lang="en-GB" dirty="0"/>
+          </a:p>
+          <a:p>
+            <a:endParaRPr lang="en-GB" dirty="0"/>
+          </a:p>
+          <a:p>
+            <a:endParaRPr lang="en-GB" dirty="0"/>
+          </a:p>
+        </p:txBody>
+      </p:sp>
+      <p:pic>
+        <p:nvPicPr>
+          <p:cNvPr id="10" name="Picture 9">
+            <a:extLst>
+              <a:ext uri="{FF2B5EF4-FFF2-40B4-BE49-F238E27FC236}">
+                <a16:creationId xmlns:a16="http://schemas.microsoft.com/office/drawing/2014/main" id="{8B3A24C2-4256-1BF5-EFF1-5529ACE1FC3E}"/>
+              </a:ext>
+            </a:extLst>
+          </p:cNvPr>
+          <p:cNvPicPr>
+            <a:picLocks noChangeAspect="1"/>
+          </p:cNvPicPr>
+          <p:nvPr/>
+        </p:nvPicPr>
+        <p:blipFill>
+          <a:blip r:embed="rId2"/>
+          <a:stretch>
+            <a:fillRect/>
+          </a:stretch>
+        </p:blipFill>
+        <p:spPr>
+          <a:xfrm>
+            <a:off x="6781116" y="3061898"/>
+            <a:ext cx="4894579" cy="3329452"/>
+          </a:xfrm>
+          <a:prstGeom prst="rect">
+            <a:avLst/>
+          </a:prstGeom>
+        </p:spPr>
+      </p:pic>
+      <p:pic>
+        <p:nvPicPr>
+          <p:cNvPr id="12" name="Picture 11">
+            <a:extLst>
+              <a:ext uri="{FF2B5EF4-FFF2-40B4-BE49-F238E27FC236}">
+                <a16:creationId xmlns:a16="http://schemas.microsoft.com/office/drawing/2014/main" id="{91FD9670-FD9C-8514-845D-7BD7A75FCE0C}"/>
+              </a:ext>
+            </a:extLst>
+          </p:cNvPr>
+          <p:cNvPicPr>
+            <a:picLocks noChangeAspect="1"/>
+          </p:cNvPicPr>
+          <p:nvPr/>
+        </p:nvPicPr>
+        <p:blipFill>
+          <a:blip r:embed="rId3"/>
+          <a:stretch>
+            <a:fillRect/>
+          </a:stretch>
+        </p:blipFill>
+        <p:spPr>
+          <a:xfrm>
+            <a:off x="495300" y="3061898"/>
+            <a:ext cx="4915586" cy="3329452"/>
+          </a:xfrm>
+          <a:prstGeom prst="rect">
+            <a:avLst/>
+          </a:prstGeom>
+        </p:spPr>
+      </p:pic>
+    </p:spTree>
+    <p:extLst>
+      <p:ext uri="{BB962C8B-B14F-4D97-AF65-F5344CB8AC3E}">
+        <p14:creationId xmlns:p14="http://schemas.microsoft.com/office/powerpoint/2010/main" val="3674636417"/>
+      </p:ext>
+    </p:extLst>
+  </p:cSld>
+  <p:clrMapOvr>
+    <a:masterClrMapping/>
+  </p:clrMapOvr>
+</p:sld>
+</file>
+
+<file path=ppt/slides/slide27.xml><?xml version="1.0" encoding="utf-8"?>
+<p:sld xmlns:a="http://schemas.openxmlformats.org/drawingml/2006/main" xmlns:r="http://schemas.openxmlformats.org/officeDocument/2006/relationships" xmlns:p="http://schemas.openxmlformats.org/presentationml/2006/main">
+  <p:cSld>
+    <p:spTree>
+      <p:nvGrpSpPr>
+        <p:cNvPr id="1" name=""/>
+        <p:cNvGrpSpPr/>
+        <p:nvPr/>
+      </p:nvGrpSpPr>
+      <p:grpSpPr>
+        <a:xfrm>
+          <a:off x="0" y="0"/>
+          <a:ext cx="0" cy="0"/>
+          <a:chOff x="0" y="0"/>
+          <a:chExt cx="0" cy="0"/>
+        </a:xfrm>
+      </p:grpSpPr>
+      <p:sp>
+        <p:nvSpPr>
+          <p:cNvPr id="2" name="Title 1">
+            <a:extLst>
+              <a:ext uri="{FF2B5EF4-FFF2-40B4-BE49-F238E27FC236}">
+                <a16:creationId xmlns:a16="http://schemas.microsoft.com/office/drawing/2014/main" id="{A4E131D9-2A3D-872C-C30C-2482491AD2E1}"/>
+              </a:ext>
+            </a:extLst>
+          </p:cNvPr>
+          <p:cNvSpPr>
+            <a:spLocks noGrp="1"/>
+          </p:cNvSpPr>
+          <p:nvPr>
+            <p:ph type="title"/>
+          </p:nvPr>
+        </p:nvSpPr>
+        <p:spPr/>
+        <p:txBody>
+          <a:bodyPr/>
+          <a:lstStyle/>
+          <a:p>
+            <a:r>
+              <a:rPr lang="en-GB" sz="1800" dirty="0">
+                <a:solidFill>
+                  <a:srgbClr val="669768"/>
+                </a:solidFill>
+                <a:effectLst/>
+                <a:latin typeface="Consolas" panose="020B0609020204030204" pitchFamily="49" charset="0"/>
+              </a:rPr>
+              <a:t>--the end--</a:t>
+            </a:r>
+            <a:br>
+              <a:rPr lang="en-GB" sz="1800" dirty="0">
+                <a:solidFill>
+                  <a:srgbClr val="AAAAAA"/>
+                </a:solidFill>
+                <a:effectLst/>
+                <a:latin typeface="Consolas" panose="020B0609020204030204" pitchFamily="49" charset="0"/>
+              </a:rPr>
+            </a:br>
+            <a:endParaRPr lang="en-GB" dirty="0"/>
+          </a:p>
+        </p:txBody>
+      </p:sp>
+    </p:spTree>
+    <p:extLst>
+      <p:ext uri="{BB962C8B-B14F-4D97-AF65-F5344CB8AC3E}">
+        <p14:creationId xmlns:p14="http://schemas.microsoft.com/office/powerpoint/2010/main" val="615412978"/>
       </p:ext>
     </p:extLst>
   </p:cSld>

</xml_diff>